<commit_message>
Inversa por cofactores listo
</commit_message>
<xml_diff>
--- a/Manual de usuarios.pptx
+++ b/Manual de usuarios.pptx
@@ -5,13 +5,21 @@
     <p:sldMasterId id="2147483672" r:id="rId1"/>
   </p:sldMasterIdLst>
   <p:notesMasterIdLst>
-    <p:notesMasterId r:id="rId6"/>
+    <p:notesMasterId r:id="rId14"/>
   </p:notesMasterIdLst>
   <p:sldIdLst>
     <p:sldId id="256" r:id="rId2"/>
     <p:sldId id="257" r:id="rId3"/>
     <p:sldId id="279" r:id="rId4"/>
     <p:sldId id="280" r:id="rId5"/>
+    <p:sldId id="281" r:id="rId6"/>
+    <p:sldId id="282" r:id="rId7"/>
+    <p:sldId id="283" r:id="rId8"/>
+    <p:sldId id="284" r:id="rId9"/>
+    <p:sldId id="285" r:id="rId10"/>
+    <p:sldId id="286" r:id="rId11"/>
+    <p:sldId id="287" r:id="rId12"/>
+    <p:sldId id="288" r:id="rId13"/>
   </p:sldIdLst>
   <p:sldSz cx="12192000" cy="6858000"/>
   <p:notesSz cx="6858000" cy="9144000"/>
@@ -200,7 +208,7 @@
           <a:p>
             <a:fld id="{9CFE4FB3-B0EA-4548-9C8D-B20354F60B32}" type="datetimeFigureOut">
               <a:rPr lang="es-CR" smtClean="0"/>
-              <a:t>12/03/2017</a:t>
+              <a:t>19/03/2017</a:t>
             </a:fld>
             <a:endParaRPr lang="es-CR"/>
           </a:p>
@@ -694,7 +702,7 @@
           <a:p>
             <a:fld id="{D142E2C0-F492-41D1-8A4D-B27062CCA24D}" type="datetimeFigureOut">
               <a:rPr lang="es-CR" smtClean="0"/>
-              <a:t>12/03/2017</a:t>
+              <a:t>19/03/2017</a:t>
             </a:fld>
             <a:endParaRPr lang="es-CR"/>
           </a:p>
@@ -902,7 +910,7 @@
           <a:p>
             <a:fld id="{D142E2C0-F492-41D1-8A4D-B27062CCA24D}" type="datetimeFigureOut">
               <a:rPr lang="es-CR" smtClean="0"/>
-              <a:t>12/03/2017</a:t>
+              <a:t>19/03/2017</a:t>
             </a:fld>
             <a:endParaRPr lang="es-CR"/>
           </a:p>
@@ -1158,7 +1166,7 @@
           <a:p>
             <a:fld id="{D142E2C0-F492-41D1-8A4D-B27062CCA24D}" type="datetimeFigureOut">
               <a:rPr lang="es-CR" smtClean="0"/>
-              <a:t>12/03/2017</a:t>
+              <a:t>19/03/2017</a:t>
             </a:fld>
             <a:endParaRPr lang="es-CR"/>
           </a:p>
@@ -1328,7 +1336,7 @@
           <a:p>
             <a:fld id="{D142E2C0-F492-41D1-8A4D-B27062CCA24D}" type="datetimeFigureOut">
               <a:rPr lang="es-CR" smtClean="0"/>
-              <a:t>12/03/2017</a:t>
+              <a:t>19/03/2017</a:t>
             </a:fld>
             <a:endParaRPr lang="es-CR"/>
           </a:p>
@@ -1671,7 +1679,7 @@
           <a:p>
             <a:fld id="{D142E2C0-F492-41D1-8A4D-B27062CCA24D}" type="datetimeFigureOut">
               <a:rPr lang="es-CR" smtClean="0"/>
-              <a:t>12/03/2017</a:t>
+              <a:t>19/03/2017</a:t>
             </a:fld>
             <a:endParaRPr lang="es-CR"/>
           </a:p>
@@ -1946,7 +1954,7 @@
           <a:p>
             <a:fld id="{D142E2C0-F492-41D1-8A4D-B27062CCA24D}" type="datetimeFigureOut">
               <a:rPr lang="es-CR" smtClean="0"/>
-              <a:t>12/03/2017</a:t>
+              <a:t>19/03/2017</a:t>
             </a:fld>
             <a:endParaRPr lang="es-CR"/>
           </a:p>
@@ -2325,7 +2333,7 @@
           <a:p>
             <a:fld id="{D142E2C0-F492-41D1-8A4D-B27062CCA24D}" type="datetimeFigureOut">
               <a:rPr lang="es-CR" smtClean="0"/>
-              <a:t>12/03/2017</a:t>
+              <a:t>19/03/2017</a:t>
             </a:fld>
             <a:endParaRPr lang="es-CR"/>
           </a:p>
@@ -2443,7 +2451,7 @@
           <a:p>
             <a:fld id="{D142E2C0-F492-41D1-8A4D-B27062CCA24D}" type="datetimeFigureOut">
               <a:rPr lang="es-CR" smtClean="0"/>
-              <a:t>12/03/2017</a:t>
+              <a:t>19/03/2017</a:t>
             </a:fld>
             <a:endParaRPr lang="es-CR"/>
           </a:p>
@@ -2614,7 +2622,7 @@
           <a:p>
             <a:fld id="{D142E2C0-F492-41D1-8A4D-B27062CCA24D}" type="datetimeFigureOut">
               <a:rPr lang="es-CR" smtClean="0"/>
-              <a:t>12/03/2017</a:t>
+              <a:t>19/03/2017</a:t>
             </a:fld>
             <a:endParaRPr lang="es-CR"/>
           </a:p>
@@ -2968,7 +2976,7 @@
           <a:p>
             <a:fld id="{D142E2C0-F492-41D1-8A4D-B27062CCA24D}" type="datetimeFigureOut">
               <a:rPr lang="es-CR" smtClean="0"/>
-              <a:t>12/03/2017</a:t>
+              <a:t>19/03/2017</a:t>
             </a:fld>
             <a:endParaRPr lang="es-CR"/>
           </a:p>
@@ -3345,7 +3353,7 @@
           <a:p>
             <a:fld id="{D142E2C0-F492-41D1-8A4D-B27062CCA24D}" type="datetimeFigureOut">
               <a:rPr lang="es-CR" smtClean="0"/>
-              <a:t>12/03/2017</a:t>
+              <a:t>19/03/2017</a:t>
             </a:fld>
             <a:endParaRPr lang="es-CR"/>
           </a:p>
@@ -3632,7 +3640,7 @@
           <a:p>
             <a:fld id="{D142E2C0-F492-41D1-8A4D-B27062CCA24D}" type="datetimeFigureOut">
               <a:rPr lang="es-CR" smtClean="0"/>
-              <a:t>12/03/2017</a:t>
+              <a:t>19/03/2017</a:t>
             </a:fld>
             <a:endParaRPr lang="es-CR"/>
           </a:p>
@@ -4315,7 +4323,7 @@
         <p:spPr>
           <a:xfrm>
             <a:off x="120769" y="6457890"/>
-            <a:ext cx="5062540" cy="400110"/>
+            <a:ext cx="4732386" cy="400110"/>
           </a:xfrm>
           <a:prstGeom prst="rect">
             <a:avLst/>
@@ -4336,7 +4344,7 @@
                 <a:latin typeface="Times New Roman" panose="02020603050405020304" pitchFamily="18" charset="0"/>
                 <a:cs typeface="Times New Roman" panose="02020603050405020304" pitchFamily="18" charset="0"/>
               </a:rPr>
-              <a:t>Tarea Programada    Algebra Lineal    Matrices</a:t>
+              <a:t>Tarea Programada, Algebra Lineal, Matrices</a:t>
             </a:r>
           </a:p>
         </p:txBody>
@@ -4371,7 +4379,7 @@
                 <a:latin typeface="Times New Roman" panose="02020603050405020304" pitchFamily="18" charset="0"/>
                 <a:cs typeface="Times New Roman" panose="02020603050405020304" pitchFamily="18" charset="0"/>
               </a:rPr>
-              <a:t>Ingeniería en Computación    Sede Regional San Carlos</a:t>
+              <a:t>Ingeniería en Computación, Sede Regional San Carlos</a:t>
             </a:r>
           </a:p>
         </p:txBody>
@@ -4421,6 +4429,718 @@
     <p:extLst>
       <p:ext uri="{BB962C8B-B14F-4D97-AF65-F5344CB8AC3E}">
         <p14:creationId xmlns:p14="http://schemas.microsoft.com/office/powerpoint/2010/main" val="3936254765"/>
+      </p:ext>
+    </p:extLst>
+  </p:cSld>
+  <p:clrMapOvr>
+    <a:masterClrMapping/>
+  </p:clrMapOvr>
+</p:sld>
+</file>
+
+<file path=ppt/slides/slide10.xml><?xml version="1.0" encoding="utf-8"?>
+<p:sld xmlns:a="http://schemas.openxmlformats.org/drawingml/2006/main" xmlns:r="http://schemas.openxmlformats.org/officeDocument/2006/relationships" xmlns:p="http://schemas.openxmlformats.org/presentationml/2006/main">
+  <p:cSld>
+    <p:spTree>
+      <p:nvGrpSpPr>
+        <p:cNvPr id="1" name=""/>
+        <p:cNvGrpSpPr/>
+        <p:nvPr/>
+      </p:nvGrpSpPr>
+      <p:grpSpPr>
+        <a:xfrm>
+          <a:off x="0" y="0"/>
+          <a:ext cx="0" cy="0"/>
+          <a:chOff x="0" y="0"/>
+          <a:chExt cx="0" cy="0"/>
+        </a:xfrm>
+      </p:grpSpPr>
+      <p:sp>
+        <p:nvSpPr>
+          <p:cNvPr id="2" name="Título 1"/>
+          <p:cNvSpPr>
+            <a:spLocks noGrp="1"/>
+          </p:cNvSpPr>
+          <p:nvPr>
+            <p:ph type="title"/>
+          </p:nvPr>
+        </p:nvSpPr>
+        <p:spPr/>
+        <p:txBody>
+          <a:bodyPr/>
+          <a:lstStyle/>
+          <a:p>
+            <a:r>
+              <a:rPr lang="es-CR" dirty="0">
+                <a:latin typeface="Times New Roman" panose="02020603050405020304" pitchFamily="18" charset="0"/>
+                <a:cs typeface="Times New Roman" panose="02020603050405020304" pitchFamily="18" charset="0"/>
+              </a:rPr>
+              <a:t>Pasos para operación resta de matrices</a:t>
+            </a:r>
+            <a:endParaRPr lang="en-US" dirty="0">
+              <a:latin typeface="Times New Roman" panose="02020603050405020304" pitchFamily="18" charset="0"/>
+              <a:cs typeface="Times New Roman" panose="02020603050405020304" pitchFamily="18" charset="0"/>
+            </a:endParaRPr>
+          </a:p>
+        </p:txBody>
+      </p:sp>
+      <p:sp>
+        <p:nvSpPr>
+          <p:cNvPr id="3" name="Marcador de contenido 2"/>
+          <p:cNvSpPr>
+            <a:spLocks noGrp="1"/>
+          </p:cNvSpPr>
+          <p:nvPr>
+            <p:ph idx="1"/>
+          </p:nvPr>
+        </p:nvSpPr>
+        <p:spPr/>
+        <p:txBody>
+          <a:bodyPr/>
+          <a:lstStyle/>
+          <a:p>
+            <a:r>
+              <a:rPr lang="en-US" dirty="0">
+                <a:latin typeface="Times New Roman" panose="02020603050405020304" pitchFamily="18" charset="0"/>
+                <a:cs typeface="Times New Roman" panose="02020603050405020304" pitchFamily="18" charset="0"/>
+              </a:rPr>
+              <a:t>Para </a:t>
+            </a:r>
+            <a:r>
+              <a:rPr lang="en-US" dirty="0" err="1">
+                <a:latin typeface="Times New Roman" panose="02020603050405020304" pitchFamily="18" charset="0"/>
+                <a:cs typeface="Times New Roman" panose="02020603050405020304" pitchFamily="18" charset="0"/>
+              </a:rPr>
+              <a:t>poder</a:t>
+            </a:r>
+            <a:r>
+              <a:rPr lang="en-US" dirty="0">
+                <a:latin typeface="Times New Roman" panose="02020603050405020304" pitchFamily="18" charset="0"/>
+                <a:cs typeface="Times New Roman" panose="02020603050405020304" pitchFamily="18" charset="0"/>
+              </a:rPr>
+              <a:t> </a:t>
+            </a:r>
+            <a:r>
+              <a:rPr lang="en-US" dirty="0" err="1">
+                <a:latin typeface="Times New Roman" panose="02020603050405020304" pitchFamily="18" charset="0"/>
+                <a:cs typeface="Times New Roman" panose="02020603050405020304" pitchFamily="18" charset="0"/>
+              </a:rPr>
+              <a:t>realizar</a:t>
+            </a:r>
+            <a:r>
+              <a:rPr lang="en-US" dirty="0">
+                <a:latin typeface="Times New Roman" panose="02020603050405020304" pitchFamily="18" charset="0"/>
+                <a:cs typeface="Times New Roman" panose="02020603050405020304" pitchFamily="18" charset="0"/>
+              </a:rPr>
+              <a:t> la </a:t>
+            </a:r>
+            <a:r>
+              <a:rPr lang="en-US" dirty="0" err="1">
+                <a:latin typeface="Times New Roman" panose="02020603050405020304" pitchFamily="18" charset="0"/>
+                <a:cs typeface="Times New Roman" panose="02020603050405020304" pitchFamily="18" charset="0"/>
+              </a:rPr>
+              <a:t>operación</a:t>
+            </a:r>
+            <a:r>
+              <a:rPr lang="en-US" dirty="0">
+                <a:latin typeface="Times New Roman" panose="02020603050405020304" pitchFamily="18" charset="0"/>
+                <a:cs typeface="Times New Roman" panose="02020603050405020304" pitchFamily="18" charset="0"/>
+              </a:rPr>
+              <a:t> de </a:t>
+            </a:r>
+            <a:r>
+              <a:rPr lang="en-US" dirty="0" err="1">
+                <a:latin typeface="Times New Roman" panose="02020603050405020304" pitchFamily="18" charset="0"/>
+                <a:cs typeface="Times New Roman" panose="02020603050405020304" pitchFamily="18" charset="0"/>
+              </a:rPr>
+              <a:t>restar</a:t>
+            </a:r>
+            <a:r>
+              <a:rPr lang="en-US" dirty="0">
+                <a:latin typeface="Times New Roman" panose="02020603050405020304" pitchFamily="18" charset="0"/>
+                <a:cs typeface="Times New Roman" panose="02020603050405020304" pitchFamily="18" charset="0"/>
+              </a:rPr>
+              <a:t> dos matrices </a:t>
+            </a:r>
+            <a:r>
+              <a:rPr lang="en-US" dirty="0" err="1">
+                <a:latin typeface="Times New Roman" panose="02020603050405020304" pitchFamily="18" charset="0"/>
+                <a:cs typeface="Times New Roman" panose="02020603050405020304" pitchFamily="18" charset="0"/>
+              </a:rPr>
+              <a:t>es</a:t>
+            </a:r>
+            <a:r>
+              <a:rPr lang="en-US" dirty="0">
+                <a:latin typeface="Times New Roman" panose="02020603050405020304" pitchFamily="18" charset="0"/>
+                <a:cs typeface="Times New Roman" panose="02020603050405020304" pitchFamily="18" charset="0"/>
+              </a:rPr>
+              <a:t> </a:t>
+            </a:r>
+            <a:r>
+              <a:rPr lang="en-US" dirty="0" err="1">
+                <a:latin typeface="Times New Roman" panose="02020603050405020304" pitchFamily="18" charset="0"/>
+                <a:cs typeface="Times New Roman" panose="02020603050405020304" pitchFamily="18" charset="0"/>
+              </a:rPr>
+              <a:t>necesario</a:t>
+            </a:r>
+            <a:r>
+              <a:rPr lang="en-US" dirty="0">
+                <a:latin typeface="Times New Roman" panose="02020603050405020304" pitchFamily="18" charset="0"/>
+                <a:cs typeface="Times New Roman" panose="02020603050405020304" pitchFamily="18" charset="0"/>
+              </a:rPr>
+              <a:t> que </a:t>
+            </a:r>
+            <a:r>
+              <a:rPr lang="en-US" dirty="0" err="1">
+                <a:latin typeface="Times New Roman" panose="02020603050405020304" pitchFamily="18" charset="0"/>
+                <a:cs typeface="Times New Roman" panose="02020603050405020304" pitchFamily="18" charset="0"/>
+              </a:rPr>
+              <a:t>los</a:t>
+            </a:r>
+            <a:r>
+              <a:rPr lang="en-US" dirty="0">
+                <a:latin typeface="Times New Roman" panose="02020603050405020304" pitchFamily="18" charset="0"/>
+                <a:cs typeface="Times New Roman" panose="02020603050405020304" pitchFamily="18" charset="0"/>
+              </a:rPr>
+              <a:t> </a:t>
+            </a:r>
+            <a:r>
+              <a:rPr lang="en-US" dirty="0" err="1">
+                <a:latin typeface="Times New Roman" panose="02020603050405020304" pitchFamily="18" charset="0"/>
+                <a:cs typeface="Times New Roman" panose="02020603050405020304" pitchFamily="18" charset="0"/>
+              </a:rPr>
+              <a:t>tama</a:t>
+            </a:r>
+            <a:r>
+              <a:rPr lang="es-CR" dirty="0" err="1">
+                <a:latin typeface="Times New Roman" panose="02020603050405020304" pitchFamily="18" charset="0"/>
+                <a:cs typeface="Times New Roman" panose="02020603050405020304" pitchFamily="18" charset="0"/>
+              </a:rPr>
+              <a:t>ños</a:t>
+            </a:r>
+            <a:r>
+              <a:rPr lang="es-CR" dirty="0">
+                <a:latin typeface="Times New Roman" panose="02020603050405020304" pitchFamily="18" charset="0"/>
+                <a:cs typeface="Times New Roman" panose="02020603050405020304" pitchFamily="18" charset="0"/>
+              </a:rPr>
+              <a:t> de ambas matrices sean iguales tanto en filas como columnas.</a:t>
+            </a:r>
+          </a:p>
+          <a:p>
+            <a:r>
+              <a:rPr lang="es-CR" dirty="0">
+                <a:latin typeface="Times New Roman" panose="02020603050405020304" pitchFamily="18" charset="0"/>
+                <a:cs typeface="Times New Roman" panose="02020603050405020304" pitchFamily="18" charset="0"/>
+              </a:rPr>
+              <a:t>Luego hay que seleccionar la opción de resta en la sección de operaciones, seguidamente hay que llenar la matriz con los números que deseamos ingresar. Por ultimo hay que seleccionar la manera en la que deseamos mostrar los resultado; ya sea paso a paso o el resultado final de una vez.</a:t>
+            </a:r>
+            <a:endParaRPr lang="en-US" dirty="0">
+              <a:latin typeface="Times New Roman" panose="02020603050405020304" pitchFamily="18" charset="0"/>
+              <a:cs typeface="Times New Roman" panose="02020603050405020304" pitchFamily="18" charset="0"/>
+            </a:endParaRPr>
+          </a:p>
+        </p:txBody>
+      </p:sp>
+      <p:sp>
+        <p:nvSpPr>
+          <p:cNvPr id="4" name="CuadroTexto 3"/>
+          <p:cNvSpPr txBox="1"/>
+          <p:nvPr/>
+        </p:nvSpPr>
+        <p:spPr>
+          <a:xfrm>
+            <a:off x="6202392" y="6457890"/>
+            <a:ext cx="5848710" cy="400110"/>
+          </a:xfrm>
+          <a:prstGeom prst="rect">
+            <a:avLst/>
+          </a:prstGeom>
+          <a:noFill/>
+        </p:spPr>
+        <p:txBody>
+          <a:bodyPr wrap="square" rtlCol="0">
+            <a:spAutoFit/>
+          </a:bodyPr>
+          <a:lstStyle/>
+          <a:p>
+            <a:r>
+              <a:rPr lang="es-CR" sz="2000" dirty="0">
+                <a:solidFill>
+                  <a:schemeClr val="bg1"/>
+                </a:solidFill>
+                <a:latin typeface="Times New Roman" panose="02020603050405020304" pitchFamily="18" charset="0"/>
+                <a:cs typeface="Times New Roman" panose="02020603050405020304" pitchFamily="18" charset="0"/>
+              </a:rPr>
+              <a:t>Ingeniería en Computación, Sede Regional San Carlos</a:t>
+            </a:r>
+          </a:p>
+        </p:txBody>
+      </p:sp>
+      <p:sp>
+        <p:nvSpPr>
+          <p:cNvPr id="5" name="CuadroTexto 4"/>
+          <p:cNvSpPr txBox="1"/>
+          <p:nvPr/>
+        </p:nvSpPr>
+        <p:spPr>
+          <a:xfrm>
+            <a:off x="120769" y="6457890"/>
+            <a:ext cx="4732386" cy="400110"/>
+          </a:xfrm>
+          <a:prstGeom prst="rect">
+            <a:avLst/>
+          </a:prstGeom>
+          <a:noFill/>
+        </p:spPr>
+        <p:txBody>
+          <a:bodyPr wrap="none" rtlCol="0">
+            <a:spAutoFit/>
+          </a:bodyPr>
+          <a:lstStyle/>
+          <a:p>
+            <a:r>
+              <a:rPr lang="es-CR" sz="2000" dirty="0">
+                <a:solidFill>
+                  <a:schemeClr val="bg1"/>
+                </a:solidFill>
+                <a:latin typeface="Times New Roman" panose="02020603050405020304" pitchFamily="18" charset="0"/>
+                <a:cs typeface="Times New Roman" panose="02020603050405020304" pitchFamily="18" charset="0"/>
+              </a:rPr>
+              <a:t>Tarea Programada, Algebra Lineal, Matrices</a:t>
+            </a:r>
+          </a:p>
+        </p:txBody>
+      </p:sp>
+    </p:spTree>
+    <p:extLst>
+      <p:ext uri="{BB962C8B-B14F-4D97-AF65-F5344CB8AC3E}">
+        <p14:creationId xmlns:p14="http://schemas.microsoft.com/office/powerpoint/2010/main" val="1673419495"/>
+      </p:ext>
+    </p:extLst>
+  </p:cSld>
+  <p:clrMapOvr>
+    <a:masterClrMapping/>
+  </p:clrMapOvr>
+</p:sld>
+</file>
+
+<file path=ppt/slides/slide11.xml><?xml version="1.0" encoding="utf-8"?>
+<p:sld xmlns:a="http://schemas.openxmlformats.org/drawingml/2006/main" xmlns:r="http://schemas.openxmlformats.org/officeDocument/2006/relationships" xmlns:p="http://schemas.openxmlformats.org/presentationml/2006/main">
+  <p:cSld>
+    <p:spTree>
+      <p:nvGrpSpPr>
+        <p:cNvPr id="1" name=""/>
+        <p:cNvGrpSpPr/>
+        <p:nvPr/>
+      </p:nvGrpSpPr>
+      <p:grpSpPr>
+        <a:xfrm>
+          <a:off x="0" y="0"/>
+          <a:ext cx="0" cy="0"/>
+          <a:chOff x="0" y="0"/>
+          <a:chExt cx="0" cy="0"/>
+        </a:xfrm>
+      </p:grpSpPr>
+      <p:sp>
+        <p:nvSpPr>
+          <p:cNvPr id="3" name="Marcador de contenido 2"/>
+          <p:cNvSpPr>
+            <a:spLocks noGrp="1"/>
+          </p:cNvSpPr>
+          <p:nvPr>
+            <p:ph idx="1"/>
+          </p:nvPr>
+        </p:nvSpPr>
+        <p:spPr/>
+        <p:txBody>
+          <a:bodyPr/>
+          <a:lstStyle/>
+          <a:p>
+            <a:endParaRPr lang="en-US"/>
+          </a:p>
+        </p:txBody>
+      </p:sp>
+      <p:sp>
+        <p:nvSpPr>
+          <p:cNvPr id="4" name="CuadroTexto 3"/>
+          <p:cNvSpPr txBox="1"/>
+          <p:nvPr/>
+        </p:nvSpPr>
+        <p:spPr>
+          <a:xfrm>
+            <a:off x="6202392" y="6457890"/>
+            <a:ext cx="5848710" cy="400110"/>
+          </a:xfrm>
+          <a:prstGeom prst="rect">
+            <a:avLst/>
+          </a:prstGeom>
+          <a:noFill/>
+        </p:spPr>
+        <p:txBody>
+          <a:bodyPr wrap="square" rtlCol="0">
+            <a:spAutoFit/>
+          </a:bodyPr>
+          <a:lstStyle/>
+          <a:p>
+            <a:r>
+              <a:rPr lang="es-CR" sz="2000" dirty="0">
+                <a:solidFill>
+                  <a:schemeClr val="bg1"/>
+                </a:solidFill>
+                <a:latin typeface="Times New Roman" panose="02020603050405020304" pitchFamily="18" charset="0"/>
+                <a:cs typeface="Times New Roman" panose="02020603050405020304" pitchFamily="18" charset="0"/>
+              </a:rPr>
+              <a:t>Ingeniería en Computación, Sede Regional San Carlos</a:t>
+            </a:r>
+          </a:p>
+        </p:txBody>
+      </p:sp>
+      <p:sp>
+        <p:nvSpPr>
+          <p:cNvPr id="5" name="CuadroTexto 4"/>
+          <p:cNvSpPr txBox="1"/>
+          <p:nvPr/>
+        </p:nvSpPr>
+        <p:spPr>
+          <a:xfrm>
+            <a:off x="120769" y="6457890"/>
+            <a:ext cx="4732386" cy="400110"/>
+          </a:xfrm>
+          <a:prstGeom prst="rect">
+            <a:avLst/>
+          </a:prstGeom>
+          <a:noFill/>
+        </p:spPr>
+        <p:txBody>
+          <a:bodyPr wrap="none" rtlCol="0">
+            <a:spAutoFit/>
+          </a:bodyPr>
+          <a:lstStyle/>
+          <a:p>
+            <a:r>
+              <a:rPr lang="es-CR" sz="2000" dirty="0">
+                <a:solidFill>
+                  <a:schemeClr val="bg1"/>
+                </a:solidFill>
+                <a:latin typeface="Times New Roman" panose="02020603050405020304" pitchFamily="18" charset="0"/>
+                <a:cs typeface="Times New Roman" panose="02020603050405020304" pitchFamily="18" charset="0"/>
+              </a:rPr>
+              <a:t>Tarea Programada, Algebra Lineal, Matrices</a:t>
+            </a:r>
+          </a:p>
+        </p:txBody>
+      </p:sp>
+      <p:sp>
+        <p:nvSpPr>
+          <p:cNvPr id="6" name="Título 1"/>
+          <p:cNvSpPr txBox="1">
+            <a:spLocks/>
+          </p:cNvSpPr>
+          <p:nvPr/>
+        </p:nvSpPr>
+        <p:spPr>
+          <a:xfrm>
+            <a:off x="1173192" y="261400"/>
+            <a:ext cx="10058400" cy="983973"/>
+          </a:xfrm>
+          <a:prstGeom prst="rect">
+            <a:avLst/>
+          </a:prstGeom>
+        </p:spPr>
+        <p:txBody>
+          <a:bodyPr vert="horz" lIns="91440" tIns="45720" rIns="91440" bIns="45720" rtlCol="0" anchor="b">
+            <a:normAutofit/>
+          </a:bodyPr>
+          <a:lstStyle>
+            <a:lvl1pPr algn="l" defTabSz="914400" rtl="0" eaLnBrk="1" latinLnBrk="0" hangingPunct="1">
+              <a:lnSpc>
+                <a:spcPct val="85000"/>
+              </a:lnSpc>
+              <a:spcBef>
+                <a:spcPct val="0"/>
+              </a:spcBef>
+              <a:buNone/>
+              <a:defRPr sz="4800" kern="1200" spc="-50" baseline="0">
+                <a:solidFill>
+                  <a:schemeClr val="tx1">
+                    <a:lumMod val="75000"/>
+                    <a:lumOff val="25000"/>
+                  </a:schemeClr>
+                </a:solidFill>
+                <a:latin typeface="+mj-lt"/>
+                <a:ea typeface="+mj-ea"/>
+                <a:cs typeface="+mj-cs"/>
+              </a:defRPr>
+            </a:lvl1pPr>
+          </a:lstStyle>
+          <a:p>
+            <a:r>
+              <a:rPr lang="es-CR" dirty="0">
+                <a:latin typeface="Times New Roman" panose="02020603050405020304" pitchFamily="18" charset="0"/>
+                <a:cs typeface="Times New Roman" panose="02020603050405020304" pitchFamily="18" charset="0"/>
+              </a:rPr>
+              <a:t>Resultado final sin pasos</a:t>
+            </a:r>
+            <a:endParaRPr lang="en-US" dirty="0">
+              <a:latin typeface="Times New Roman" panose="02020603050405020304" pitchFamily="18" charset="0"/>
+              <a:cs typeface="Times New Roman" panose="02020603050405020304" pitchFamily="18" charset="0"/>
+            </a:endParaRPr>
+          </a:p>
+        </p:txBody>
+      </p:sp>
+      <p:pic>
+        <p:nvPicPr>
+          <p:cNvPr id="10" name="Imagen 9"/>
+          <p:cNvPicPr>
+            <a:picLocks noChangeAspect="1"/>
+          </p:cNvPicPr>
+          <p:nvPr/>
+        </p:nvPicPr>
+        <p:blipFill>
+          <a:blip r:embed="rId2"/>
+          <a:stretch>
+            <a:fillRect/>
+          </a:stretch>
+        </p:blipFill>
+        <p:spPr>
+          <a:xfrm>
+            <a:off x="1550208" y="1834169"/>
+            <a:ext cx="9304368" cy="4023360"/>
+          </a:xfrm>
+          <a:prstGeom prst="rect">
+            <a:avLst/>
+          </a:prstGeom>
+        </p:spPr>
+      </p:pic>
+    </p:spTree>
+    <p:extLst>
+      <p:ext uri="{BB962C8B-B14F-4D97-AF65-F5344CB8AC3E}">
+        <p14:creationId xmlns:p14="http://schemas.microsoft.com/office/powerpoint/2010/main" val="1670809872"/>
+      </p:ext>
+    </p:extLst>
+  </p:cSld>
+  <p:clrMapOvr>
+    <a:masterClrMapping/>
+  </p:clrMapOvr>
+</p:sld>
+</file>
+
+<file path=ppt/slides/slide12.xml><?xml version="1.0" encoding="utf-8"?>
+<p:sld xmlns:a="http://schemas.openxmlformats.org/drawingml/2006/main" xmlns:r="http://schemas.openxmlformats.org/officeDocument/2006/relationships" xmlns:p="http://schemas.openxmlformats.org/presentationml/2006/main">
+  <p:cSld>
+    <p:spTree>
+      <p:nvGrpSpPr>
+        <p:cNvPr id="1" name=""/>
+        <p:cNvGrpSpPr/>
+        <p:nvPr/>
+      </p:nvGrpSpPr>
+      <p:grpSpPr>
+        <a:xfrm>
+          <a:off x="0" y="0"/>
+          <a:ext cx="0" cy="0"/>
+          <a:chOff x="0" y="0"/>
+          <a:chExt cx="0" cy="0"/>
+        </a:xfrm>
+      </p:grpSpPr>
+      <p:sp>
+        <p:nvSpPr>
+          <p:cNvPr id="3" name="Marcador de contenido 2"/>
+          <p:cNvSpPr>
+            <a:spLocks noGrp="1"/>
+          </p:cNvSpPr>
+          <p:nvPr>
+            <p:ph idx="1"/>
+          </p:nvPr>
+        </p:nvSpPr>
+        <p:spPr/>
+        <p:txBody>
+          <a:bodyPr/>
+          <a:lstStyle/>
+          <a:p>
+            <a:endParaRPr lang="en-US" dirty="0"/>
+          </a:p>
+        </p:txBody>
+      </p:sp>
+      <p:sp>
+        <p:nvSpPr>
+          <p:cNvPr id="4" name="CuadroTexto 3"/>
+          <p:cNvSpPr txBox="1"/>
+          <p:nvPr/>
+        </p:nvSpPr>
+        <p:spPr>
+          <a:xfrm>
+            <a:off x="6202392" y="6457890"/>
+            <a:ext cx="5848710" cy="400110"/>
+          </a:xfrm>
+          <a:prstGeom prst="rect">
+            <a:avLst/>
+          </a:prstGeom>
+          <a:noFill/>
+        </p:spPr>
+        <p:txBody>
+          <a:bodyPr wrap="square" rtlCol="0">
+            <a:spAutoFit/>
+          </a:bodyPr>
+          <a:lstStyle/>
+          <a:p>
+            <a:r>
+              <a:rPr lang="es-CR" sz="2000" dirty="0">
+                <a:solidFill>
+                  <a:schemeClr val="bg1"/>
+                </a:solidFill>
+                <a:latin typeface="Times New Roman" panose="02020603050405020304" pitchFamily="18" charset="0"/>
+                <a:cs typeface="Times New Roman" panose="02020603050405020304" pitchFamily="18" charset="0"/>
+              </a:rPr>
+              <a:t>Ingeniería en Computación, Sede Regional San Carlos</a:t>
+            </a:r>
+          </a:p>
+        </p:txBody>
+      </p:sp>
+      <p:sp>
+        <p:nvSpPr>
+          <p:cNvPr id="5" name="CuadroTexto 4"/>
+          <p:cNvSpPr txBox="1"/>
+          <p:nvPr/>
+        </p:nvSpPr>
+        <p:spPr>
+          <a:xfrm>
+            <a:off x="120769" y="6457890"/>
+            <a:ext cx="4732386" cy="400110"/>
+          </a:xfrm>
+          <a:prstGeom prst="rect">
+            <a:avLst/>
+          </a:prstGeom>
+          <a:noFill/>
+        </p:spPr>
+        <p:txBody>
+          <a:bodyPr wrap="none" rtlCol="0">
+            <a:spAutoFit/>
+          </a:bodyPr>
+          <a:lstStyle/>
+          <a:p>
+            <a:r>
+              <a:rPr lang="es-CR" sz="2000" dirty="0">
+                <a:solidFill>
+                  <a:schemeClr val="bg1"/>
+                </a:solidFill>
+                <a:latin typeface="Times New Roman" panose="02020603050405020304" pitchFamily="18" charset="0"/>
+                <a:cs typeface="Times New Roman" panose="02020603050405020304" pitchFamily="18" charset="0"/>
+              </a:rPr>
+              <a:t>Tarea Programada, Algebra Lineal, Matrices</a:t>
+            </a:r>
+          </a:p>
+        </p:txBody>
+      </p:sp>
+      <p:sp>
+        <p:nvSpPr>
+          <p:cNvPr id="6" name="Título 1"/>
+          <p:cNvSpPr txBox="1">
+            <a:spLocks/>
+          </p:cNvSpPr>
+          <p:nvPr/>
+        </p:nvSpPr>
+        <p:spPr>
+          <a:xfrm>
+            <a:off x="1097280" y="235803"/>
+            <a:ext cx="10058400" cy="766945"/>
+          </a:xfrm>
+          <a:prstGeom prst="rect">
+            <a:avLst/>
+          </a:prstGeom>
+        </p:spPr>
+        <p:txBody>
+          <a:bodyPr vert="horz" lIns="91440" tIns="45720" rIns="91440" bIns="45720" rtlCol="0" anchor="b">
+            <a:normAutofit/>
+          </a:bodyPr>
+          <a:lstStyle>
+            <a:lvl1pPr algn="l" defTabSz="914400" rtl="0" eaLnBrk="1" latinLnBrk="0" hangingPunct="1">
+              <a:lnSpc>
+                <a:spcPct val="85000"/>
+              </a:lnSpc>
+              <a:spcBef>
+                <a:spcPct val="0"/>
+              </a:spcBef>
+              <a:buNone/>
+              <a:defRPr sz="4800" kern="1200" spc="-50" baseline="0">
+                <a:solidFill>
+                  <a:schemeClr val="tx1">
+                    <a:lumMod val="75000"/>
+                    <a:lumOff val="25000"/>
+                  </a:schemeClr>
+                </a:solidFill>
+                <a:latin typeface="+mj-lt"/>
+                <a:ea typeface="+mj-ea"/>
+                <a:cs typeface="+mj-cs"/>
+              </a:defRPr>
+            </a:lvl1pPr>
+          </a:lstStyle>
+          <a:p>
+            <a:r>
+              <a:rPr lang="es-CR" dirty="0">
+                <a:latin typeface="Times New Roman" panose="02020603050405020304" pitchFamily="18" charset="0"/>
+                <a:cs typeface="Times New Roman" panose="02020603050405020304" pitchFamily="18" charset="0"/>
+              </a:rPr>
+              <a:t>Resultado final con pasos</a:t>
+            </a:r>
+            <a:endParaRPr lang="en-US" dirty="0">
+              <a:latin typeface="Times New Roman" panose="02020603050405020304" pitchFamily="18" charset="0"/>
+              <a:cs typeface="Times New Roman" panose="02020603050405020304" pitchFamily="18" charset="0"/>
+            </a:endParaRPr>
+          </a:p>
+        </p:txBody>
+      </p:sp>
+      <p:pic>
+        <p:nvPicPr>
+          <p:cNvPr id="10" name="Imagen 9"/>
+          <p:cNvPicPr>
+            <a:picLocks noChangeAspect="1"/>
+          </p:cNvPicPr>
+          <p:nvPr/>
+        </p:nvPicPr>
+        <p:blipFill>
+          <a:blip r:embed="rId2"/>
+          <a:stretch>
+            <a:fillRect/>
+          </a:stretch>
+        </p:blipFill>
+        <p:spPr>
+          <a:xfrm>
+            <a:off x="5644645" y="3549358"/>
+            <a:ext cx="6358890" cy="2743200"/>
+          </a:xfrm>
+          <a:prstGeom prst="rect">
+            <a:avLst/>
+          </a:prstGeom>
+        </p:spPr>
+      </p:pic>
+      <p:pic>
+        <p:nvPicPr>
+          <p:cNvPr id="9" name="Imagen 8"/>
+          <p:cNvPicPr>
+            <a:picLocks noChangeAspect="1"/>
+          </p:cNvPicPr>
+          <p:nvPr/>
+        </p:nvPicPr>
+        <p:blipFill>
+          <a:blip r:embed="rId3"/>
+          <a:stretch>
+            <a:fillRect/>
+          </a:stretch>
+        </p:blipFill>
+        <p:spPr>
+          <a:xfrm>
+            <a:off x="236804" y="979548"/>
+            <a:ext cx="6396974" cy="2743200"/>
+          </a:xfrm>
+          <a:prstGeom prst="rect">
+            <a:avLst/>
+          </a:prstGeom>
+        </p:spPr>
+      </p:pic>
+    </p:spTree>
+    <p:extLst>
+      <p:ext uri="{BB962C8B-B14F-4D97-AF65-F5344CB8AC3E}">
+        <p14:creationId xmlns:p14="http://schemas.microsoft.com/office/powerpoint/2010/main" val="585298549"/>
       </p:ext>
     </p:extLst>
   </p:cSld>
@@ -4465,7 +5185,7 @@
           <a:lstStyle/>
           <a:p>
             <a:r>
-              <a:rPr lang="es-CR" sz="4000" dirty="0">
+              <a:rPr lang="es-CR" dirty="0">
                 <a:latin typeface="Times New Roman" panose="02020603050405020304" pitchFamily="18" charset="0"/>
                 <a:cs typeface="Times New Roman" panose="02020603050405020304" pitchFamily="18" charset="0"/>
               </a:rPr>
@@ -4493,10 +5213,82 @@
               <a:buFont typeface="Wingdings" panose="05000000000000000000" pitchFamily="2" charset="2"/>
               <a:buChar char="Ø"/>
             </a:pPr>
+            <a:r>
+              <a:rPr lang="es-CR" dirty="0">
+                <a:latin typeface="Times New Roman" panose="02020603050405020304" pitchFamily="18" charset="0"/>
+                <a:cs typeface="Times New Roman" panose="02020603050405020304" pitchFamily="18" charset="0"/>
+              </a:rPr>
+              <a:t>Pagina Principal</a:t>
+            </a:r>
+          </a:p>
+          <a:p>
+            <a:pPr>
+              <a:buFont typeface="Wingdings" panose="05000000000000000000" pitchFamily="2" charset="2"/>
+              <a:buChar char="Ø"/>
+            </a:pPr>
+            <a:r>
+              <a:rPr lang="es-CR" dirty="0">
+                <a:latin typeface="Times New Roman" panose="02020603050405020304" pitchFamily="18" charset="0"/>
+                <a:cs typeface="Times New Roman" panose="02020603050405020304" pitchFamily="18" charset="0"/>
+              </a:rPr>
+              <a:t>Manejo de la sección tamaño</a:t>
+            </a:r>
+          </a:p>
+          <a:p>
+            <a:pPr>
+              <a:buFont typeface="Wingdings" panose="05000000000000000000" pitchFamily="2" charset="2"/>
+              <a:buChar char="Ø"/>
+            </a:pPr>
+            <a:r>
+              <a:rPr lang="es-CR" dirty="0">
+                <a:latin typeface="Times New Roman" panose="02020603050405020304" pitchFamily="18" charset="0"/>
+                <a:cs typeface="Times New Roman" panose="02020603050405020304" pitchFamily="18" charset="0"/>
+              </a:rPr>
+              <a:t>Creando matriz para suma</a:t>
+            </a:r>
+          </a:p>
+          <a:p>
+            <a:pPr>
+              <a:buFont typeface="Wingdings" panose="05000000000000000000" pitchFamily="2" charset="2"/>
+              <a:buChar char="Ø"/>
+            </a:pPr>
+            <a:r>
+              <a:rPr lang="es-CR" dirty="0">
+                <a:latin typeface="Times New Roman" panose="02020603050405020304" pitchFamily="18" charset="0"/>
+                <a:cs typeface="Times New Roman" panose="02020603050405020304" pitchFamily="18" charset="0"/>
+              </a:rPr>
+              <a:t>Pasos para operación suma de matrices</a:t>
+            </a:r>
             <a:endParaRPr lang="es-CR" dirty="0">
               <a:latin typeface="Times New Roman" panose="02020603050405020304" pitchFamily="18" charset="0"/>
               <a:cs typeface="Times New Roman" panose="02020603050405020304" pitchFamily="18" charset="0"/>
             </a:endParaRPr>
+          </a:p>
+          <a:p>
+            <a:pPr>
+              <a:buFont typeface="Wingdings" panose="05000000000000000000" pitchFamily="2" charset="2"/>
+              <a:buChar char="Ø"/>
+            </a:pPr>
+            <a:r>
+              <a:rPr lang="es-CR" dirty="0">
+                <a:latin typeface="Times New Roman" panose="02020603050405020304" pitchFamily="18" charset="0"/>
+                <a:cs typeface="Times New Roman" panose="02020603050405020304" pitchFamily="18" charset="0"/>
+              </a:rPr>
+              <a:t>Resultado final de suma sin pasos</a:t>
+            </a:r>
+          </a:p>
+          <a:p>
+            <a:pPr>
+              <a:buFont typeface="Wingdings" panose="05000000000000000000" pitchFamily="2" charset="2"/>
+              <a:buChar char="Ø"/>
+            </a:pPr>
+            <a:r>
+              <a:rPr lang="es-CR" dirty="0">
+                <a:latin typeface="Times New Roman" panose="02020603050405020304" pitchFamily="18" charset="0"/>
+                <a:cs typeface="Times New Roman" panose="02020603050405020304" pitchFamily="18" charset="0"/>
+              </a:rPr>
+              <a:t>Creando matriz para resta</a:t>
+            </a:r>
           </a:p>
         </p:txBody>
       </p:sp>
@@ -4571,7 +5363,7 @@
                 <a:latin typeface="Times New Roman" panose="02020603050405020304" pitchFamily="18" charset="0"/>
                 <a:cs typeface="Times New Roman" panose="02020603050405020304" pitchFamily="18" charset="0"/>
               </a:rPr>
-              <a:t>Ingeniería en Computación    Sede Regional San Carlos</a:t>
+              <a:t>Ingeniería en Computación, Sede Regional San Carlos</a:t>
             </a:r>
           </a:p>
         </p:txBody>
@@ -4585,7 +5377,7 @@
         <p:spPr>
           <a:xfrm>
             <a:off x="120769" y="6457890"/>
-            <a:ext cx="5062540" cy="400110"/>
+            <a:ext cx="4732386" cy="400110"/>
           </a:xfrm>
           <a:prstGeom prst="rect">
             <a:avLst/>
@@ -4606,7 +5398,7 @@
                 <a:latin typeface="Times New Roman" panose="02020603050405020304" pitchFamily="18" charset="0"/>
                 <a:cs typeface="Times New Roman" panose="02020603050405020304" pitchFamily="18" charset="0"/>
               </a:rPr>
-              <a:t>Tarea Programada    Algebra Lineal    Matrices</a:t>
+              <a:t>Tarea Programada, Algebra Lineal, Matrices</a:t>
             </a:r>
           </a:p>
         </p:txBody>
@@ -4691,99 +5483,100 @@
           </a:p>
         </p:txBody>
       </p:sp>
+      <p:sp>
+        <p:nvSpPr>
+          <p:cNvPr id="5" name="CuadroTexto 4"/>
+          <p:cNvSpPr txBox="1"/>
+          <p:nvPr/>
+        </p:nvSpPr>
+        <p:spPr>
+          <a:xfrm>
+            <a:off x="120769" y="6457890"/>
+            <a:ext cx="4732386" cy="400110"/>
+          </a:xfrm>
+          <a:prstGeom prst="rect">
+            <a:avLst/>
+          </a:prstGeom>
+          <a:noFill/>
+        </p:spPr>
+        <p:txBody>
+          <a:bodyPr wrap="none" rtlCol="0">
+            <a:spAutoFit/>
+          </a:bodyPr>
+          <a:lstStyle/>
+          <a:p>
+            <a:r>
+              <a:rPr lang="es-CR" sz="2000" dirty="0">
+                <a:solidFill>
+                  <a:schemeClr val="bg1"/>
+                </a:solidFill>
+                <a:latin typeface="Times New Roman" panose="02020603050405020304" pitchFamily="18" charset="0"/>
+                <a:cs typeface="Times New Roman" panose="02020603050405020304" pitchFamily="18" charset="0"/>
+              </a:rPr>
+              <a:t>Tarea Programada, Algebra Lineal, Matrices</a:t>
+            </a:r>
+          </a:p>
+        </p:txBody>
+      </p:sp>
+      <p:sp>
+        <p:nvSpPr>
+          <p:cNvPr id="6" name="CuadroTexto 5"/>
+          <p:cNvSpPr txBox="1"/>
+          <p:nvPr/>
+        </p:nvSpPr>
+        <p:spPr>
+          <a:xfrm>
+            <a:off x="6202392" y="6457890"/>
+            <a:ext cx="5848710" cy="400110"/>
+          </a:xfrm>
+          <a:prstGeom prst="rect">
+            <a:avLst/>
+          </a:prstGeom>
+          <a:noFill/>
+        </p:spPr>
+        <p:txBody>
+          <a:bodyPr wrap="square" rtlCol="0">
+            <a:spAutoFit/>
+          </a:bodyPr>
+          <a:lstStyle/>
+          <a:p>
+            <a:r>
+              <a:rPr lang="es-CR" sz="2000" dirty="0">
+                <a:solidFill>
+                  <a:schemeClr val="bg1"/>
+                </a:solidFill>
+                <a:latin typeface="Times New Roman" panose="02020603050405020304" pitchFamily="18" charset="0"/>
+                <a:cs typeface="Times New Roman" panose="02020603050405020304" pitchFamily="18" charset="0"/>
+              </a:rPr>
+              <a:t>Ingeniería en Computación, Sede Regional San Carlos</a:t>
+            </a:r>
+          </a:p>
+        </p:txBody>
+      </p:sp>
       <p:pic>
         <p:nvPicPr>
-          <p:cNvPr id="4" name="Imagen 3"/>
+          <p:cNvPr id="3" name="Imagen 2"/>
           <p:cNvPicPr>
             <a:picLocks noChangeAspect="1"/>
           </p:cNvPicPr>
           <p:nvPr/>
         </p:nvPicPr>
-        <p:blipFill rotWithShape="1">
+        <p:blipFill>
           <a:blip r:embed="rId2"/>
-          <a:srcRect/>
-          <a:stretch/>
+          <a:stretch>
+            <a:fillRect/>
+          </a:stretch>
         </p:blipFill>
         <p:spPr>
           <a:xfrm>
-            <a:off x="391601" y="1223551"/>
-            <a:ext cx="11370365" cy="4980291"/>
+            <a:off x="622189" y="1489996"/>
+            <a:ext cx="10909189" cy="4701449"/>
           </a:xfrm>
           <a:prstGeom prst="rect">
             <a:avLst/>
           </a:prstGeom>
         </p:spPr>
       </p:pic>
-      <p:sp>
-        <p:nvSpPr>
-          <p:cNvPr id="5" name="CuadroTexto 4"/>
-          <p:cNvSpPr txBox="1"/>
-          <p:nvPr/>
-        </p:nvSpPr>
-        <p:spPr>
-          <a:xfrm>
-            <a:off x="120769" y="6457890"/>
-            <a:ext cx="5062540" cy="400110"/>
-          </a:xfrm>
-          <a:prstGeom prst="rect">
-            <a:avLst/>
-          </a:prstGeom>
-          <a:noFill/>
-        </p:spPr>
-        <p:txBody>
-          <a:bodyPr wrap="none" rtlCol="0">
-            <a:spAutoFit/>
-          </a:bodyPr>
-          <a:lstStyle/>
-          <a:p>
-            <a:r>
-              <a:rPr lang="es-CR" sz="2000" dirty="0">
-                <a:solidFill>
-                  <a:schemeClr val="bg1"/>
-                </a:solidFill>
-                <a:latin typeface="Times New Roman" panose="02020603050405020304" pitchFamily="18" charset="0"/>
-                <a:cs typeface="Times New Roman" panose="02020603050405020304" pitchFamily="18" charset="0"/>
-              </a:rPr>
-              <a:t>Tarea Programada    Algebra Lineal    Matrices</a:t>
-            </a:r>
-          </a:p>
-        </p:txBody>
-      </p:sp>
-      <p:sp>
-        <p:nvSpPr>
-          <p:cNvPr id="6" name="CuadroTexto 5"/>
-          <p:cNvSpPr txBox="1"/>
-          <p:nvPr/>
-        </p:nvSpPr>
-        <p:spPr>
-          <a:xfrm>
-            <a:off x="6202392" y="6457890"/>
-            <a:ext cx="5848710" cy="400110"/>
-          </a:xfrm>
-          <a:prstGeom prst="rect">
-            <a:avLst/>
-          </a:prstGeom>
-          <a:noFill/>
-        </p:spPr>
-        <p:txBody>
-          <a:bodyPr wrap="square" rtlCol="0">
-            <a:spAutoFit/>
-          </a:bodyPr>
-          <a:lstStyle/>
-          <a:p>
-            <a:r>
-              <a:rPr lang="es-CR" sz="2000" dirty="0">
-                <a:solidFill>
-                  <a:schemeClr val="bg1"/>
-                </a:solidFill>
-                <a:latin typeface="Times New Roman" panose="02020603050405020304" pitchFamily="18" charset="0"/>
-                <a:cs typeface="Times New Roman" panose="02020603050405020304" pitchFamily="18" charset="0"/>
-              </a:rPr>
-              <a:t>Ingeniería en Computación    Sede Regional San Carlos</a:t>
-            </a:r>
-          </a:p>
-        </p:txBody>
-      </p:sp>
     </p:spTree>
     <p:extLst>
       <p:ext uri="{BB962C8B-B14F-4D97-AF65-F5344CB8AC3E}">
@@ -4829,7 +5622,59 @@
           <a:bodyPr/>
           <a:lstStyle/>
           <a:p>
-            <a:endParaRPr lang="en-US"/>
+            <a:r>
+              <a:rPr lang="en-US" dirty="0" err="1">
+                <a:latin typeface="Times New Roman" panose="02020603050405020304" pitchFamily="18" charset="0"/>
+                <a:cs typeface="Times New Roman" panose="02020603050405020304" pitchFamily="18" charset="0"/>
+              </a:rPr>
+              <a:t>Manejo</a:t>
+            </a:r>
+            <a:r>
+              <a:rPr lang="en-US" dirty="0">
+                <a:latin typeface="Times New Roman" panose="02020603050405020304" pitchFamily="18" charset="0"/>
+                <a:cs typeface="Times New Roman" panose="02020603050405020304" pitchFamily="18" charset="0"/>
+              </a:rPr>
+              <a:t> de la </a:t>
+            </a:r>
+            <a:r>
+              <a:rPr lang="en-US" dirty="0" err="1">
+                <a:latin typeface="Times New Roman" panose="02020603050405020304" pitchFamily="18" charset="0"/>
+                <a:cs typeface="Times New Roman" panose="02020603050405020304" pitchFamily="18" charset="0"/>
+              </a:rPr>
+              <a:t>secci</a:t>
+            </a:r>
+            <a:r>
+              <a:rPr lang="es-CR" dirty="0" err="1">
+                <a:latin typeface="Times New Roman" panose="02020603050405020304" pitchFamily="18" charset="0"/>
+                <a:cs typeface="Times New Roman" panose="02020603050405020304" pitchFamily="18" charset="0"/>
+              </a:rPr>
+              <a:t>ón</a:t>
+            </a:r>
+            <a:r>
+              <a:rPr lang="en-US" dirty="0">
+                <a:latin typeface="Times New Roman" panose="02020603050405020304" pitchFamily="18" charset="0"/>
+                <a:cs typeface="Times New Roman" panose="02020603050405020304" pitchFamily="18" charset="0"/>
+              </a:rPr>
+              <a:t> </a:t>
+            </a:r>
+            <a:r>
+              <a:rPr lang="en-US" dirty="0" err="1">
+                <a:latin typeface="Times New Roman" panose="02020603050405020304" pitchFamily="18" charset="0"/>
+                <a:cs typeface="Times New Roman" panose="02020603050405020304" pitchFamily="18" charset="0"/>
+              </a:rPr>
+              <a:t>tama</a:t>
+            </a:r>
+            <a:r>
+              <a:rPr lang="es-CR" dirty="0" err="1">
+                <a:latin typeface="Times New Roman" panose="02020603050405020304" pitchFamily="18" charset="0"/>
+                <a:cs typeface="Times New Roman" panose="02020603050405020304" pitchFamily="18" charset="0"/>
+              </a:rPr>
+              <a:t>ño</a:t>
+            </a:r>
+            <a:endParaRPr lang="en-US" dirty="0">
+              <a:latin typeface="Times New Roman" panose="02020603050405020304" pitchFamily="18" charset="0"/>
+              <a:cs typeface="Times New Roman" panose="02020603050405020304" pitchFamily="18" charset="0"/>
+            </a:endParaRPr>
           </a:p>
         </p:txBody>
       </p:sp>
@@ -4843,12 +5688,834 @@
             <p:ph idx="1"/>
           </p:nvPr>
         </p:nvSpPr>
-        <p:spPr/>
-        <p:txBody>
-          <a:bodyPr/>
-          <a:lstStyle/>
-          <a:p>
-            <a:endParaRPr lang="en-US"/>
+        <p:spPr>
+          <a:xfrm>
+            <a:off x="1097280" y="2942893"/>
+            <a:ext cx="10058400" cy="3477784"/>
+          </a:xfrm>
+        </p:spPr>
+        <p:txBody>
+          <a:bodyPr>
+            <a:normAutofit/>
+          </a:bodyPr>
+          <a:lstStyle/>
+          <a:p>
+            <a:r>
+              <a:rPr lang="es-CR" sz="2400" b="1" dirty="0">
+                <a:latin typeface="Times New Roman" panose="02020603050405020304" pitchFamily="18" charset="0"/>
+                <a:cs typeface="Times New Roman" panose="02020603050405020304" pitchFamily="18" charset="0"/>
+              </a:rPr>
+              <a:t>Matriz</a:t>
+            </a:r>
+            <a:r>
+              <a:rPr lang="en-US" sz="2400" b="1" dirty="0">
+                <a:latin typeface="Times New Roman" panose="02020603050405020304" pitchFamily="18" charset="0"/>
+                <a:cs typeface="Times New Roman" panose="02020603050405020304" pitchFamily="18" charset="0"/>
+              </a:rPr>
+              <a:t>: </a:t>
+            </a:r>
+            <a:r>
+              <a:rPr lang="en-US" sz="2400" dirty="0" err="1">
+                <a:latin typeface="Times New Roman" panose="02020603050405020304" pitchFamily="18" charset="0"/>
+                <a:cs typeface="Times New Roman" panose="02020603050405020304" pitchFamily="18" charset="0"/>
+              </a:rPr>
+              <a:t>Selecciona</a:t>
+            </a:r>
+            <a:r>
+              <a:rPr lang="en-US" sz="2400" dirty="0">
+                <a:latin typeface="Times New Roman" panose="02020603050405020304" pitchFamily="18" charset="0"/>
+                <a:cs typeface="Times New Roman" panose="02020603050405020304" pitchFamily="18" charset="0"/>
+              </a:rPr>
+              <a:t> la </a:t>
+            </a:r>
+            <a:r>
+              <a:rPr lang="en-US" sz="2400" dirty="0" err="1">
+                <a:latin typeface="Times New Roman" panose="02020603050405020304" pitchFamily="18" charset="0"/>
+                <a:cs typeface="Times New Roman" panose="02020603050405020304" pitchFamily="18" charset="0"/>
+              </a:rPr>
+              <a:t>matriz</a:t>
+            </a:r>
+            <a:r>
+              <a:rPr lang="en-US" sz="2400" dirty="0">
+                <a:latin typeface="Times New Roman" panose="02020603050405020304" pitchFamily="18" charset="0"/>
+                <a:cs typeface="Times New Roman" panose="02020603050405020304" pitchFamily="18" charset="0"/>
+              </a:rPr>
+              <a:t> con la </a:t>
+            </a:r>
+            <a:r>
+              <a:rPr lang="en-US" sz="2400" dirty="0" err="1">
+                <a:latin typeface="Times New Roman" panose="02020603050405020304" pitchFamily="18" charset="0"/>
+                <a:cs typeface="Times New Roman" panose="02020603050405020304" pitchFamily="18" charset="0"/>
+              </a:rPr>
+              <a:t>cual</a:t>
+            </a:r>
+            <a:r>
+              <a:rPr lang="en-US" sz="2400" dirty="0">
+                <a:latin typeface="Times New Roman" panose="02020603050405020304" pitchFamily="18" charset="0"/>
+                <a:cs typeface="Times New Roman" panose="02020603050405020304" pitchFamily="18" charset="0"/>
+              </a:rPr>
+              <a:t> </a:t>
+            </a:r>
+            <a:r>
+              <a:rPr lang="en-US" sz="2400" dirty="0" err="1">
+                <a:latin typeface="Times New Roman" panose="02020603050405020304" pitchFamily="18" charset="0"/>
+                <a:cs typeface="Times New Roman" panose="02020603050405020304" pitchFamily="18" charset="0"/>
+              </a:rPr>
+              <a:t>desea</a:t>
+            </a:r>
+            <a:r>
+              <a:rPr lang="en-US" sz="2400" dirty="0">
+                <a:latin typeface="Times New Roman" panose="02020603050405020304" pitchFamily="18" charset="0"/>
+                <a:cs typeface="Times New Roman" panose="02020603050405020304" pitchFamily="18" charset="0"/>
+              </a:rPr>
+              <a:t> </a:t>
+            </a:r>
+            <a:r>
+              <a:rPr lang="en-US" sz="2400" dirty="0" err="1">
+                <a:latin typeface="Times New Roman" panose="02020603050405020304" pitchFamily="18" charset="0"/>
+                <a:cs typeface="Times New Roman" panose="02020603050405020304" pitchFamily="18" charset="0"/>
+              </a:rPr>
+              <a:t>realizar</a:t>
+            </a:r>
+            <a:r>
+              <a:rPr lang="en-US" sz="2400" dirty="0">
+                <a:latin typeface="Times New Roman" panose="02020603050405020304" pitchFamily="18" charset="0"/>
+                <a:cs typeface="Times New Roman" panose="02020603050405020304" pitchFamily="18" charset="0"/>
+              </a:rPr>
+              <a:t> </a:t>
+            </a:r>
+            <a:r>
+              <a:rPr lang="en-US" sz="2400" dirty="0" err="1">
+                <a:latin typeface="Times New Roman" panose="02020603050405020304" pitchFamily="18" charset="0"/>
+                <a:cs typeface="Times New Roman" panose="02020603050405020304" pitchFamily="18" charset="0"/>
+              </a:rPr>
+              <a:t>alguna</a:t>
+            </a:r>
+            <a:r>
+              <a:rPr lang="es-CR" sz="2400" dirty="0">
+                <a:latin typeface="Times New Roman" panose="02020603050405020304" pitchFamily="18" charset="0"/>
+                <a:cs typeface="Times New Roman" panose="02020603050405020304" pitchFamily="18" charset="0"/>
+              </a:rPr>
+              <a:t> operación.</a:t>
+            </a:r>
+            <a:endParaRPr lang="en-US" sz="2400" b="1" dirty="0">
+              <a:latin typeface="Times New Roman" panose="02020603050405020304" pitchFamily="18" charset="0"/>
+              <a:cs typeface="Times New Roman" panose="02020603050405020304" pitchFamily="18" charset="0"/>
+            </a:endParaRPr>
+          </a:p>
+          <a:p>
+            <a:r>
+              <a:rPr lang="en-US" sz="2400" b="1" dirty="0" err="1">
+                <a:latin typeface="Times New Roman" panose="02020603050405020304" pitchFamily="18" charset="0"/>
+                <a:cs typeface="Times New Roman" panose="02020603050405020304" pitchFamily="18" charset="0"/>
+              </a:rPr>
+              <a:t>Filas</a:t>
+            </a:r>
+            <a:r>
+              <a:rPr lang="en-US" sz="2400" b="1" dirty="0">
+                <a:latin typeface="Times New Roman" panose="02020603050405020304" pitchFamily="18" charset="0"/>
+                <a:cs typeface="Times New Roman" panose="02020603050405020304" pitchFamily="18" charset="0"/>
+              </a:rPr>
+              <a:t>: </a:t>
+            </a:r>
+            <a:r>
+              <a:rPr lang="en-US" sz="2400" dirty="0" err="1">
+                <a:latin typeface="Times New Roman" panose="02020603050405020304" pitchFamily="18" charset="0"/>
+                <a:cs typeface="Times New Roman" panose="02020603050405020304" pitchFamily="18" charset="0"/>
+              </a:rPr>
+              <a:t>Selecciona</a:t>
+            </a:r>
+            <a:r>
+              <a:rPr lang="en-US" sz="2400" dirty="0">
+                <a:latin typeface="Times New Roman" panose="02020603050405020304" pitchFamily="18" charset="0"/>
+                <a:cs typeface="Times New Roman" panose="02020603050405020304" pitchFamily="18" charset="0"/>
+              </a:rPr>
+              <a:t> el </a:t>
+            </a:r>
+            <a:r>
+              <a:rPr lang="en-US" sz="2400" dirty="0" err="1">
+                <a:latin typeface="Times New Roman" panose="02020603050405020304" pitchFamily="18" charset="0"/>
+                <a:cs typeface="Times New Roman" panose="02020603050405020304" pitchFamily="18" charset="0"/>
+              </a:rPr>
+              <a:t>tamaño</a:t>
+            </a:r>
+            <a:r>
+              <a:rPr lang="en-US" sz="2400" dirty="0">
+                <a:latin typeface="Times New Roman" panose="02020603050405020304" pitchFamily="18" charset="0"/>
+                <a:cs typeface="Times New Roman" panose="02020603050405020304" pitchFamily="18" charset="0"/>
+              </a:rPr>
+              <a:t> de </a:t>
+            </a:r>
+            <a:r>
+              <a:rPr lang="en-US" sz="2400" dirty="0" err="1">
+                <a:latin typeface="Times New Roman" panose="02020603050405020304" pitchFamily="18" charset="0"/>
+                <a:cs typeface="Times New Roman" panose="02020603050405020304" pitchFamily="18" charset="0"/>
+              </a:rPr>
+              <a:t>filas</a:t>
+            </a:r>
+            <a:r>
+              <a:rPr lang="en-US" sz="2400" dirty="0">
+                <a:latin typeface="Times New Roman" panose="02020603050405020304" pitchFamily="18" charset="0"/>
+                <a:cs typeface="Times New Roman" panose="02020603050405020304" pitchFamily="18" charset="0"/>
+              </a:rPr>
+              <a:t> que </a:t>
+            </a:r>
+            <a:r>
+              <a:rPr lang="en-US" sz="2400" dirty="0" err="1">
+                <a:latin typeface="Times New Roman" panose="02020603050405020304" pitchFamily="18" charset="0"/>
+                <a:cs typeface="Times New Roman" panose="02020603050405020304" pitchFamily="18" charset="0"/>
+              </a:rPr>
+              <a:t>desea</a:t>
+            </a:r>
+            <a:r>
+              <a:rPr lang="en-US" sz="2400" dirty="0">
+                <a:latin typeface="Times New Roman" panose="02020603050405020304" pitchFamily="18" charset="0"/>
+                <a:cs typeface="Times New Roman" panose="02020603050405020304" pitchFamily="18" charset="0"/>
+              </a:rPr>
+              <a:t> </a:t>
+            </a:r>
+            <a:r>
+              <a:rPr lang="en-US" sz="2400" dirty="0" err="1">
+                <a:latin typeface="Times New Roman" panose="02020603050405020304" pitchFamily="18" charset="0"/>
+                <a:cs typeface="Times New Roman" panose="02020603050405020304" pitchFamily="18" charset="0"/>
+              </a:rPr>
+              <a:t>asignar</a:t>
+            </a:r>
+            <a:r>
+              <a:rPr lang="en-US" sz="2400" dirty="0">
+                <a:latin typeface="Times New Roman" panose="02020603050405020304" pitchFamily="18" charset="0"/>
+                <a:cs typeface="Times New Roman" panose="02020603050405020304" pitchFamily="18" charset="0"/>
+              </a:rPr>
+              <a:t> a la </a:t>
+            </a:r>
+            <a:r>
+              <a:rPr lang="en-US" sz="2400" dirty="0" err="1">
+                <a:latin typeface="Times New Roman" panose="02020603050405020304" pitchFamily="18" charset="0"/>
+                <a:cs typeface="Times New Roman" panose="02020603050405020304" pitchFamily="18" charset="0"/>
+              </a:rPr>
+              <a:t>matriz</a:t>
+            </a:r>
+            <a:r>
+              <a:rPr lang="en-US" sz="2400" dirty="0">
+                <a:latin typeface="Times New Roman" panose="02020603050405020304" pitchFamily="18" charset="0"/>
+                <a:cs typeface="Times New Roman" panose="02020603050405020304" pitchFamily="18" charset="0"/>
+              </a:rPr>
+              <a:t> que </a:t>
+            </a:r>
+            <a:r>
+              <a:rPr lang="en-US" sz="2400" dirty="0" err="1">
+                <a:latin typeface="Times New Roman" panose="02020603050405020304" pitchFamily="18" charset="0"/>
+                <a:cs typeface="Times New Roman" panose="02020603050405020304" pitchFamily="18" charset="0"/>
+              </a:rPr>
+              <a:t>tiene</a:t>
+            </a:r>
+            <a:r>
+              <a:rPr lang="en-US" sz="2400" dirty="0">
+                <a:latin typeface="Times New Roman" panose="02020603050405020304" pitchFamily="18" charset="0"/>
+                <a:cs typeface="Times New Roman" panose="02020603050405020304" pitchFamily="18" charset="0"/>
+              </a:rPr>
+              <a:t> </a:t>
+            </a:r>
+            <a:r>
+              <a:rPr lang="en-US" sz="2400" dirty="0" err="1">
+                <a:latin typeface="Times New Roman" panose="02020603050405020304" pitchFamily="18" charset="0"/>
+                <a:cs typeface="Times New Roman" panose="02020603050405020304" pitchFamily="18" charset="0"/>
+              </a:rPr>
+              <a:t>seleccionada</a:t>
+            </a:r>
+            <a:r>
+              <a:rPr lang="en-US" sz="2400" dirty="0">
+                <a:latin typeface="Times New Roman" panose="02020603050405020304" pitchFamily="18" charset="0"/>
+                <a:cs typeface="Times New Roman" panose="02020603050405020304" pitchFamily="18" charset="0"/>
+              </a:rPr>
+              <a:t> y que </a:t>
+            </a:r>
+            <a:r>
+              <a:rPr lang="en-US" sz="2400" dirty="0" err="1">
+                <a:latin typeface="Times New Roman" panose="02020603050405020304" pitchFamily="18" charset="0"/>
+                <a:cs typeface="Times New Roman" panose="02020603050405020304" pitchFamily="18" charset="0"/>
+              </a:rPr>
+              <a:t>desea</a:t>
+            </a:r>
+            <a:r>
+              <a:rPr lang="en-US" sz="2400" dirty="0">
+                <a:latin typeface="Times New Roman" panose="02020603050405020304" pitchFamily="18" charset="0"/>
+                <a:cs typeface="Times New Roman" panose="02020603050405020304" pitchFamily="18" charset="0"/>
+              </a:rPr>
+              <a:t> </a:t>
+            </a:r>
+            <a:r>
+              <a:rPr lang="en-US" sz="2400" dirty="0" err="1">
+                <a:latin typeface="Times New Roman" panose="02020603050405020304" pitchFamily="18" charset="0"/>
+                <a:cs typeface="Times New Roman" panose="02020603050405020304" pitchFamily="18" charset="0"/>
+              </a:rPr>
+              <a:t>crear</a:t>
+            </a:r>
+            <a:r>
+              <a:rPr lang="en-US" sz="2400" dirty="0">
+                <a:latin typeface="Times New Roman" panose="02020603050405020304" pitchFamily="18" charset="0"/>
+                <a:cs typeface="Times New Roman" panose="02020603050405020304" pitchFamily="18" charset="0"/>
+              </a:rPr>
+              <a:t>.</a:t>
+            </a:r>
+            <a:endParaRPr lang="en-US" sz="2400" b="1" dirty="0">
+              <a:latin typeface="Times New Roman" panose="02020603050405020304" pitchFamily="18" charset="0"/>
+              <a:cs typeface="Times New Roman" panose="02020603050405020304" pitchFamily="18" charset="0"/>
+            </a:endParaRPr>
+          </a:p>
+          <a:p>
+            <a:r>
+              <a:rPr lang="en-US" sz="2400" b="1" dirty="0" err="1">
+                <a:latin typeface="Times New Roman" panose="02020603050405020304" pitchFamily="18" charset="0"/>
+                <a:cs typeface="Times New Roman" panose="02020603050405020304" pitchFamily="18" charset="0"/>
+              </a:rPr>
+              <a:t>Columnas</a:t>
+            </a:r>
+            <a:r>
+              <a:rPr lang="en-US" sz="2400" b="1" dirty="0">
+                <a:latin typeface="Times New Roman" panose="02020603050405020304" pitchFamily="18" charset="0"/>
+                <a:cs typeface="Times New Roman" panose="02020603050405020304" pitchFamily="18" charset="0"/>
+              </a:rPr>
+              <a:t>: </a:t>
+            </a:r>
+            <a:r>
+              <a:rPr lang="en-US" sz="2400" dirty="0" err="1">
+                <a:latin typeface="Times New Roman" panose="02020603050405020304" pitchFamily="18" charset="0"/>
+                <a:cs typeface="Times New Roman" panose="02020603050405020304" pitchFamily="18" charset="0"/>
+              </a:rPr>
+              <a:t>Selecciona</a:t>
+            </a:r>
+            <a:r>
+              <a:rPr lang="en-US" sz="2400" dirty="0">
+                <a:latin typeface="Times New Roman" panose="02020603050405020304" pitchFamily="18" charset="0"/>
+                <a:cs typeface="Times New Roman" panose="02020603050405020304" pitchFamily="18" charset="0"/>
+              </a:rPr>
+              <a:t> el </a:t>
+            </a:r>
+            <a:r>
+              <a:rPr lang="en-US" sz="2400" dirty="0" err="1">
+                <a:latin typeface="Times New Roman" panose="02020603050405020304" pitchFamily="18" charset="0"/>
+                <a:cs typeface="Times New Roman" panose="02020603050405020304" pitchFamily="18" charset="0"/>
+              </a:rPr>
+              <a:t>tamaño</a:t>
+            </a:r>
+            <a:r>
+              <a:rPr lang="en-US" sz="2400" dirty="0">
+                <a:latin typeface="Times New Roman" panose="02020603050405020304" pitchFamily="18" charset="0"/>
+                <a:cs typeface="Times New Roman" panose="02020603050405020304" pitchFamily="18" charset="0"/>
+              </a:rPr>
+              <a:t> de </a:t>
+            </a:r>
+            <a:r>
+              <a:rPr lang="en-US" sz="2400" dirty="0" err="1">
+                <a:latin typeface="Times New Roman" panose="02020603050405020304" pitchFamily="18" charset="0"/>
+                <a:cs typeface="Times New Roman" panose="02020603050405020304" pitchFamily="18" charset="0"/>
+              </a:rPr>
+              <a:t>columnas</a:t>
+            </a:r>
+            <a:r>
+              <a:rPr lang="en-US" sz="2400" dirty="0">
+                <a:latin typeface="Times New Roman" panose="02020603050405020304" pitchFamily="18" charset="0"/>
+                <a:cs typeface="Times New Roman" panose="02020603050405020304" pitchFamily="18" charset="0"/>
+              </a:rPr>
+              <a:t> que </a:t>
+            </a:r>
+            <a:r>
+              <a:rPr lang="en-US" sz="2400" dirty="0" err="1">
+                <a:latin typeface="Times New Roman" panose="02020603050405020304" pitchFamily="18" charset="0"/>
+                <a:cs typeface="Times New Roman" panose="02020603050405020304" pitchFamily="18" charset="0"/>
+              </a:rPr>
+              <a:t>desea</a:t>
+            </a:r>
+            <a:r>
+              <a:rPr lang="en-US" sz="2400" dirty="0">
+                <a:latin typeface="Times New Roman" panose="02020603050405020304" pitchFamily="18" charset="0"/>
+                <a:cs typeface="Times New Roman" panose="02020603050405020304" pitchFamily="18" charset="0"/>
+              </a:rPr>
+              <a:t> </a:t>
+            </a:r>
+            <a:r>
+              <a:rPr lang="en-US" sz="2400" dirty="0" err="1">
+                <a:latin typeface="Times New Roman" panose="02020603050405020304" pitchFamily="18" charset="0"/>
+                <a:cs typeface="Times New Roman" panose="02020603050405020304" pitchFamily="18" charset="0"/>
+              </a:rPr>
+              <a:t>asignar</a:t>
+            </a:r>
+            <a:r>
+              <a:rPr lang="en-US" sz="2400" dirty="0">
+                <a:latin typeface="Times New Roman" panose="02020603050405020304" pitchFamily="18" charset="0"/>
+                <a:cs typeface="Times New Roman" panose="02020603050405020304" pitchFamily="18" charset="0"/>
+              </a:rPr>
+              <a:t> a la </a:t>
+            </a:r>
+            <a:r>
+              <a:rPr lang="en-US" sz="2400" dirty="0" err="1">
+                <a:latin typeface="Times New Roman" panose="02020603050405020304" pitchFamily="18" charset="0"/>
+                <a:cs typeface="Times New Roman" panose="02020603050405020304" pitchFamily="18" charset="0"/>
+              </a:rPr>
+              <a:t>matriz</a:t>
+            </a:r>
+            <a:r>
+              <a:rPr lang="en-US" sz="2400" dirty="0">
+                <a:latin typeface="Times New Roman" panose="02020603050405020304" pitchFamily="18" charset="0"/>
+                <a:cs typeface="Times New Roman" panose="02020603050405020304" pitchFamily="18" charset="0"/>
+              </a:rPr>
+              <a:t> que </a:t>
+            </a:r>
+            <a:r>
+              <a:rPr lang="en-US" sz="2400" dirty="0" err="1">
+                <a:latin typeface="Times New Roman" panose="02020603050405020304" pitchFamily="18" charset="0"/>
+                <a:cs typeface="Times New Roman" panose="02020603050405020304" pitchFamily="18" charset="0"/>
+              </a:rPr>
+              <a:t>tiene</a:t>
+            </a:r>
+            <a:r>
+              <a:rPr lang="en-US" sz="2400" dirty="0">
+                <a:latin typeface="Times New Roman" panose="02020603050405020304" pitchFamily="18" charset="0"/>
+                <a:cs typeface="Times New Roman" panose="02020603050405020304" pitchFamily="18" charset="0"/>
+              </a:rPr>
+              <a:t> </a:t>
+            </a:r>
+            <a:r>
+              <a:rPr lang="en-US" sz="2400" dirty="0" err="1">
+                <a:latin typeface="Times New Roman" panose="02020603050405020304" pitchFamily="18" charset="0"/>
+                <a:cs typeface="Times New Roman" panose="02020603050405020304" pitchFamily="18" charset="0"/>
+              </a:rPr>
+              <a:t>seleccionada</a:t>
+            </a:r>
+            <a:r>
+              <a:rPr lang="en-US" sz="2400" dirty="0">
+                <a:latin typeface="Times New Roman" panose="02020603050405020304" pitchFamily="18" charset="0"/>
+                <a:cs typeface="Times New Roman" panose="02020603050405020304" pitchFamily="18" charset="0"/>
+              </a:rPr>
+              <a:t> y que </a:t>
+            </a:r>
+            <a:r>
+              <a:rPr lang="en-US" sz="2400" dirty="0" err="1">
+                <a:latin typeface="Times New Roman" panose="02020603050405020304" pitchFamily="18" charset="0"/>
+                <a:cs typeface="Times New Roman" panose="02020603050405020304" pitchFamily="18" charset="0"/>
+              </a:rPr>
+              <a:t>desea</a:t>
+            </a:r>
+            <a:r>
+              <a:rPr lang="en-US" sz="2400" dirty="0">
+                <a:latin typeface="Times New Roman" panose="02020603050405020304" pitchFamily="18" charset="0"/>
+                <a:cs typeface="Times New Roman" panose="02020603050405020304" pitchFamily="18" charset="0"/>
+              </a:rPr>
+              <a:t> </a:t>
+            </a:r>
+            <a:r>
+              <a:rPr lang="en-US" sz="2400" dirty="0" err="1">
+                <a:latin typeface="Times New Roman" panose="02020603050405020304" pitchFamily="18" charset="0"/>
+                <a:cs typeface="Times New Roman" panose="02020603050405020304" pitchFamily="18" charset="0"/>
+              </a:rPr>
+              <a:t>crear</a:t>
+            </a:r>
+            <a:r>
+              <a:rPr lang="en-US" sz="2400" dirty="0">
+                <a:latin typeface="Times New Roman" panose="02020603050405020304" pitchFamily="18" charset="0"/>
+                <a:cs typeface="Times New Roman" panose="02020603050405020304" pitchFamily="18" charset="0"/>
+              </a:rPr>
+              <a:t>.</a:t>
+            </a:r>
+            <a:endParaRPr lang="en-US" sz="2400" b="1" dirty="0">
+              <a:latin typeface="Times New Roman" panose="02020603050405020304" pitchFamily="18" charset="0"/>
+              <a:cs typeface="Times New Roman" panose="02020603050405020304" pitchFamily="18" charset="0"/>
+            </a:endParaRPr>
+          </a:p>
+          <a:p>
+            <a:r>
+              <a:rPr lang="en-US" sz="2400" b="1" dirty="0" err="1">
+                <a:latin typeface="Times New Roman" panose="02020603050405020304" pitchFamily="18" charset="0"/>
+                <a:cs typeface="Times New Roman" panose="02020603050405020304" pitchFamily="18" charset="0"/>
+              </a:rPr>
+              <a:t>Generar</a:t>
+            </a:r>
+            <a:r>
+              <a:rPr lang="en-US" sz="2400" b="1" dirty="0">
+                <a:latin typeface="Times New Roman" panose="02020603050405020304" pitchFamily="18" charset="0"/>
+                <a:cs typeface="Times New Roman" panose="02020603050405020304" pitchFamily="18" charset="0"/>
+              </a:rPr>
+              <a:t>: </a:t>
+            </a:r>
+            <a:r>
+              <a:rPr lang="en-US" sz="2400" dirty="0">
+                <a:latin typeface="Times New Roman" panose="02020603050405020304" pitchFamily="18" charset="0"/>
+                <a:cs typeface="Times New Roman" panose="02020603050405020304" pitchFamily="18" charset="0"/>
+              </a:rPr>
+              <a:t>Genera la </a:t>
+            </a:r>
+            <a:r>
+              <a:rPr lang="en-US" sz="2400" dirty="0" err="1">
+                <a:latin typeface="Times New Roman" panose="02020603050405020304" pitchFamily="18" charset="0"/>
+                <a:cs typeface="Times New Roman" panose="02020603050405020304" pitchFamily="18" charset="0"/>
+              </a:rPr>
+              <a:t>matriz</a:t>
+            </a:r>
+            <a:r>
+              <a:rPr lang="en-US" sz="2400" dirty="0">
+                <a:latin typeface="Times New Roman" panose="02020603050405020304" pitchFamily="18" charset="0"/>
+                <a:cs typeface="Times New Roman" panose="02020603050405020304" pitchFamily="18" charset="0"/>
+              </a:rPr>
+              <a:t> </a:t>
+            </a:r>
+            <a:r>
+              <a:rPr lang="en-US" sz="2400" dirty="0" err="1">
+                <a:latin typeface="Times New Roman" panose="02020603050405020304" pitchFamily="18" charset="0"/>
+                <a:cs typeface="Times New Roman" panose="02020603050405020304" pitchFamily="18" charset="0"/>
+              </a:rPr>
+              <a:t>seleccionada</a:t>
+            </a:r>
+            <a:r>
+              <a:rPr lang="en-US" sz="2400" dirty="0">
+                <a:latin typeface="Times New Roman" panose="02020603050405020304" pitchFamily="18" charset="0"/>
+                <a:cs typeface="Times New Roman" panose="02020603050405020304" pitchFamily="18" charset="0"/>
+              </a:rPr>
+              <a:t> con el </a:t>
+            </a:r>
+            <a:r>
+              <a:rPr lang="en-US" sz="2400" dirty="0" err="1">
+                <a:latin typeface="Times New Roman" panose="02020603050405020304" pitchFamily="18" charset="0"/>
+                <a:cs typeface="Times New Roman" panose="02020603050405020304" pitchFamily="18" charset="0"/>
+              </a:rPr>
+              <a:t>tamaño</a:t>
+            </a:r>
+            <a:r>
+              <a:rPr lang="en-US" sz="2400" dirty="0">
+                <a:latin typeface="Times New Roman" panose="02020603050405020304" pitchFamily="18" charset="0"/>
+                <a:cs typeface="Times New Roman" panose="02020603050405020304" pitchFamily="18" charset="0"/>
+              </a:rPr>
+              <a:t> </a:t>
+            </a:r>
+            <a:r>
+              <a:rPr lang="en-US" sz="2400" dirty="0" err="1">
+                <a:latin typeface="Times New Roman" panose="02020603050405020304" pitchFamily="18" charset="0"/>
+                <a:cs typeface="Times New Roman" panose="02020603050405020304" pitchFamily="18" charset="0"/>
+              </a:rPr>
+              <a:t>en</a:t>
+            </a:r>
+            <a:r>
+              <a:rPr lang="en-US" sz="2400" dirty="0">
+                <a:latin typeface="Times New Roman" panose="02020603050405020304" pitchFamily="18" charset="0"/>
+                <a:cs typeface="Times New Roman" panose="02020603050405020304" pitchFamily="18" charset="0"/>
+              </a:rPr>
+              <a:t> </a:t>
+            </a:r>
+            <a:r>
+              <a:rPr lang="en-US" sz="2400" dirty="0" err="1">
+                <a:latin typeface="Times New Roman" panose="02020603050405020304" pitchFamily="18" charset="0"/>
+                <a:cs typeface="Times New Roman" panose="02020603050405020304" pitchFamily="18" charset="0"/>
+              </a:rPr>
+              <a:t>filas</a:t>
+            </a:r>
+            <a:r>
+              <a:rPr lang="en-US" sz="2400" dirty="0">
+                <a:latin typeface="Times New Roman" panose="02020603050405020304" pitchFamily="18" charset="0"/>
+                <a:cs typeface="Times New Roman" panose="02020603050405020304" pitchFamily="18" charset="0"/>
+              </a:rPr>
+              <a:t> y </a:t>
+            </a:r>
+            <a:r>
+              <a:rPr lang="en-US" sz="2400" dirty="0" err="1">
+                <a:latin typeface="Times New Roman" panose="02020603050405020304" pitchFamily="18" charset="0"/>
+                <a:cs typeface="Times New Roman" panose="02020603050405020304" pitchFamily="18" charset="0"/>
+              </a:rPr>
+              <a:t>columnas</a:t>
+            </a:r>
+            <a:r>
+              <a:rPr lang="en-US" sz="2400" dirty="0">
+                <a:latin typeface="Times New Roman" panose="02020603050405020304" pitchFamily="18" charset="0"/>
+                <a:cs typeface="Times New Roman" panose="02020603050405020304" pitchFamily="18" charset="0"/>
+              </a:rPr>
+              <a:t> </a:t>
+            </a:r>
+            <a:r>
+              <a:rPr lang="en-US" sz="2400" dirty="0" err="1">
+                <a:latin typeface="Times New Roman" panose="02020603050405020304" pitchFamily="18" charset="0"/>
+                <a:cs typeface="Times New Roman" panose="02020603050405020304" pitchFamily="18" charset="0"/>
+              </a:rPr>
+              <a:t>elegido</a:t>
+            </a:r>
+            <a:r>
+              <a:rPr lang="en-US" sz="2400" dirty="0">
+                <a:latin typeface="Times New Roman" panose="02020603050405020304" pitchFamily="18" charset="0"/>
+                <a:cs typeface="Times New Roman" panose="02020603050405020304" pitchFamily="18" charset="0"/>
+              </a:rPr>
+              <a:t>. Al </a:t>
+            </a:r>
+            <a:r>
+              <a:rPr lang="en-US" sz="2400" dirty="0" err="1">
+                <a:latin typeface="Times New Roman" panose="02020603050405020304" pitchFamily="18" charset="0"/>
+                <a:cs typeface="Times New Roman" panose="02020603050405020304" pitchFamily="18" charset="0"/>
+              </a:rPr>
+              <a:t>generar</a:t>
+            </a:r>
+            <a:r>
+              <a:rPr lang="en-US" sz="2400" dirty="0">
+                <a:latin typeface="Times New Roman" panose="02020603050405020304" pitchFamily="18" charset="0"/>
+                <a:cs typeface="Times New Roman" panose="02020603050405020304" pitchFamily="18" charset="0"/>
+              </a:rPr>
+              <a:t> las matrices de </a:t>
+            </a:r>
+            <a:r>
+              <a:rPr lang="en-US" sz="2400" dirty="0" err="1">
+                <a:latin typeface="Times New Roman" panose="02020603050405020304" pitchFamily="18" charset="0"/>
+                <a:cs typeface="Times New Roman" panose="02020603050405020304" pitchFamily="18" charset="0"/>
+              </a:rPr>
+              <a:t>una</a:t>
+            </a:r>
+            <a:r>
+              <a:rPr lang="en-US" sz="2400" dirty="0">
+                <a:latin typeface="Times New Roman" panose="02020603050405020304" pitchFamily="18" charset="0"/>
+                <a:cs typeface="Times New Roman" panose="02020603050405020304" pitchFamily="18" charset="0"/>
+              </a:rPr>
+              <a:t> </a:t>
+            </a:r>
+            <a:r>
+              <a:rPr lang="en-US" sz="2400" dirty="0" err="1">
+                <a:latin typeface="Times New Roman" panose="02020603050405020304" pitchFamily="18" charset="0"/>
+                <a:cs typeface="Times New Roman" panose="02020603050405020304" pitchFamily="18" charset="0"/>
+              </a:rPr>
+              <a:t>vez</a:t>
+            </a:r>
+            <a:r>
+              <a:rPr lang="en-US" sz="2400" dirty="0">
+                <a:latin typeface="Times New Roman" panose="02020603050405020304" pitchFamily="18" charset="0"/>
+                <a:cs typeface="Times New Roman" panose="02020603050405020304" pitchFamily="18" charset="0"/>
+              </a:rPr>
+              <a:t> </a:t>
+            </a:r>
+            <a:r>
+              <a:rPr lang="en-US" sz="2400" dirty="0" err="1">
+                <a:latin typeface="Times New Roman" panose="02020603050405020304" pitchFamily="18" charset="0"/>
+                <a:cs typeface="Times New Roman" panose="02020603050405020304" pitchFamily="18" charset="0"/>
+              </a:rPr>
+              <a:t>va</a:t>
+            </a:r>
+            <a:r>
+              <a:rPr lang="en-US" sz="2400" dirty="0">
+                <a:latin typeface="Times New Roman" panose="02020603050405020304" pitchFamily="18" charset="0"/>
+                <a:cs typeface="Times New Roman" panose="02020603050405020304" pitchFamily="18" charset="0"/>
+              </a:rPr>
+              <a:t> </a:t>
+            </a:r>
+            <a:r>
+              <a:rPr lang="en-US" sz="2400" dirty="0" err="1">
+                <a:latin typeface="Times New Roman" panose="02020603050405020304" pitchFamily="18" charset="0"/>
+                <a:cs typeface="Times New Roman" panose="02020603050405020304" pitchFamily="18" charset="0"/>
+              </a:rPr>
+              <a:t>restringuiendo</a:t>
+            </a:r>
+            <a:r>
+              <a:rPr lang="en-US" sz="2400" dirty="0">
+                <a:latin typeface="Times New Roman" panose="02020603050405020304" pitchFamily="18" charset="0"/>
+                <a:cs typeface="Times New Roman" panose="02020603050405020304" pitchFamily="18" charset="0"/>
+              </a:rPr>
+              <a:t> el </a:t>
+            </a:r>
+            <a:r>
+              <a:rPr lang="en-US" sz="2400" dirty="0" err="1">
+                <a:latin typeface="Times New Roman" panose="02020603050405020304" pitchFamily="18" charset="0"/>
+                <a:cs typeface="Times New Roman" panose="02020603050405020304" pitchFamily="18" charset="0"/>
+              </a:rPr>
+              <a:t>uso</a:t>
+            </a:r>
+            <a:r>
+              <a:rPr lang="en-US" sz="2400" dirty="0">
+                <a:latin typeface="Times New Roman" panose="02020603050405020304" pitchFamily="18" charset="0"/>
+                <a:cs typeface="Times New Roman" panose="02020603050405020304" pitchFamily="18" charset="0"/>
+              </a:rPr>
+              <a:t> de </a:t>
+            </a:r>
+            <a:r>
+              <a:rPr lang="en-US" sz="2400" dirty="0" err="1">
+                <a:latin typeface="Times New Roman" panose="02020603050405020304" pitchFamily="18" charset="0"/>
+                <a:cs typeface="Times New Roman" panose="02020603050405020304" pitchFamily="18" charset="0"/>
+              </a:rPr>
+              <a:t>algunas</a:t>
+            </a:r>
+            <a:r>
+              <a:rPr lang="en-US" sz="2400" dirty="0">
+                <a:latin typeface="Times New Roman" panose="02020603050405020304" pitchFamily="18" charset="0"/>
+                <a:cs typeface="Times New Roman" panose="02020603050405020304" pitchFamily="18" charset="0"/>
+              </a:rPr>
+              <a:t> de las </a:t>
+            </a:r>
+            <a:r>
+              <a:rPr lang="en-US" sz="2400" dirty="0" err="1">
+                <a:latin typeface="Times New Roman" panose="02020603050405020304" pitchFamily="18" charset="0"/>
+                <a:cs typeface="Times New Roman" panose="02020603050405020304" pitchFamily="18" charset="0"/>
+              </a:rPr>
+              <a:t>funciones</a:t>
+            </a:r>
+            <a:r>
+              <a:rPr lang="en-US" sz="2400" dirty="0">
+                <a:latin typeface="Times New Roman" panose="02020603050405020304" pitchFamily="18" charset="0"/>
+                <a:cs typeface="Times New Roman" panose="02020603050405020304" pitchFamily="18" charset="0"/>
+              </a:rPr>
+              <a:t> </a:t>
+            </a:r>
+            <a:r>
+              <a:rPr lang="en-US" sz="2400" dirty="0" err="1">
+                <a:latin typeface="Times New Roman" panose="02020603050405020304" pitchFamily="18" charset="0"/>
+                <a:cs typeface="Times New Roman" panose="02020603050405020304" pitchFamily="18" charset="0"/>
+              </a:rPr>
+              <a:t>ubicadas</a:t>
+            </a:r>
+            <a:r>
+              <a:rPr lang="en-US" sz="2400" dirty="0">
+                <a:latin typeface="Times New Roman" panose="02020603050405020304" pitchFamily="18" charset="0"/>
+                <a:cs typeface="Times New Roman" panose="02020603050405020304" pitchFamily="18" charset="0"/>
+              </a:rPr>
+              <a:t> </a:t>
+            </a:r>
+            <a:r>
+              <a:rPr lang="en-US" sz="2400" dirty="0" err="1">
+                <a:latin typeface="Times New Roman" panose="02020603050405020304" pitchFamily="18" charset="0"/>
+                <a:cs typeface="Times New Roman" panose="02020603050405020304" pitchFamily="18" charset="0"/>
+              </a:rPr>
+              <a:t>en</a:t>
+            </a:r>
+            <a:r>
+              <a:rPr lang="en-US" sz="2400" dirty="0">
+                <a:latin typeface="Times New Roman" panose="02020603050405020304" pitchFamily="18" charset="0"/>
+                <a:cs typeface="Times New Roman" panose="02020603050405020304" pitchFamily="18" charset="0"/>
+              </a:rPr>
+              <a:t> la </a:t>
+            </a:r>
+            <a:r>
+              <a:rPr lang="en-US" sz="2400" dirty="0" err="1">
+                <a:latin typeface="Times New Roman" panose="02020603050405020304" pitchFamily="18" charset="0"/>
+                <a:cs typeface="Times New Roman" panose="02020603050405020304" pitchFamily="18" charset="0"/>
+              </a:rPr>
+              <a:t>secci</a:t>
+            </a:r>
+            <a:r>
+              <a:rPr lang="es-CR" sz="2400" dirty="0" err="1">
+                <a:latin typeface="Times New Roman" panose="02020603050405020304" pitchFamily="18" charset="0"/>
+                <a:cs typeface="Times New Roman" panose="02020603050405020304" pitchFamily="18" charset="0"/>
+              </a:rPr>
+              <a:t>ó</a:t>
+            </a:r>
+            <a:r>
+              <a:rPr lang="en-US" sz="2400" dirty="0">
+                <a:latin typeface="Times New Roman" panose="02020603050405020304" pitchFamily="18" charset="0"/>
+                <a:cs typeface="Times New Roman" panose="02020603050405020304" pitchFamily="18" charset="0"/>
+              </a:rPr>
+              <a:t>n de </a:t>
+            </a:r>
+            <a:r>
+              <a:rPr lang="en-US" sz="2400" dirty="0" err="1">
+                <a:latin typeface="Times New Roman" panose="02020603050405020304" pitchFamily="18" charset="0"/>
+                <a:cs typeface="Times New Roman" panose="02020603050405020304" pitchFamily="18" charset="0"/>
+              </a:rPr>
+              <a:t>operaciones</a:t>
+            </a:r>
+            <a:r>
+              <a:rPr lang="en-US" sz="2400" dirty="0">
+                <a:latin typeface="Times New Roman" panose="02020603050405020304" pitchFamily="18" charset="0"/>
+                <a:cs typeface="Times New Roman" panose="02020603050405020304" pitchFamily="18" charset="0"/>
+              </a:rPr>
+              <a:t>.</a:t>
+            </a:r>
+            <a:endParaRPr lang="es-CR" sz="2400" b="1" dirty="0">
+              <a:latin typeface="Times New Roman" panose="02020603050405020304" pitchFamily="18" charset="0"/>
+              <a:cs typeface="Times New Roman" panose="02020603050405020304" pitchFamily="18" charset="0"/>
+            </a:endParaRPr>
+          </a:p>
+        </p:txBody>
+      </p:sp>
+      <p:pic>
+        <p:nvPicPr>
+          <p:cNvPr id="4" name="Imagen 3"/>
+          <p:cNvPicPr>
+            <a:picLocks noChangeAspect="1"/>
+          </p:cNvPicPr>
+          <p:nvPr/>
+        </p:nvPicPr>
+        <p:blipFill>
+          <a:blip r:embed="rId2"/>
+          <a:stretch>
+            <a:fillRect/>
+          </a:stretch>
+        </p:blipFill>
+        <p:spPr>
+          <a:xfrm>
+            <a:off x="2802255" y="1777116"/>
+            <a:ext cx="6648450" cy="1076325"/>
+          </a:xfrm>
+          <a:prstGeom prst="rect">
+            <a:avLst/>
+          </a:prstGeom>
+        </p:spPr>
+      </p:pic>
+      <p:sp>
+        <p:nvSpPr>
+          <p:cNvPr id="5" name="CuadroTexto 4"/>
+          <p:cNvSpPr txBox="1"/>
+          <p:nvPr/>
+        </p:nvSpPr>
+        <p:spPr>
+          <a:xfrm>
+            <a:off x="120769" y="6457890"/>
+            <a:ext cx="4732386" cy="400110"/>
+          </a:xfrm>
+          <a:prstGeom prst="rect">
+            <a:avLst/>
+          </a:prstGeom>
+          <a:noFill/>
+        </p:spPr>
+        <p:txBody>
+          <a:bodyPr wrap="none" rtlCol="0">
+            <a:spAutoFit/>
+          </a:bodyPr>
+          <a:lstStyle/>
+          <a:p>
+            <a:r>
+              <a:rPr lang="es-CR" sz="2000" dirty="0">
+                <a:solidFill>
+                  <a:schemeClr val="bg1"/>
+                </a:solidFill>
+                <a:latin typeface="Times New Roman" panose="02020603050405020304" pitchFamily="18" charset="0"/>
+                <a:cs typeface="Times New Roman" panose="02020603050405020304" pitchFamily="18" charset="0"/>
+              </a:rPr>
+              <a:t>Tarea Programada, Algebra Lineal, Matrices</a:t>
+            </a:r>
+          </a:p>
+        </p:txBody>
+      </p:sp>
+      <p:sp>
+        <p:nvSpPr>
+          <p:cNvPr id="6" name="CuadroTexto 5"/>
+          <p:cNvSpPr txBox="1"/>
+          <p:nvPr/>
+        </p:nvSpPr>
+        <p:spPr>
+          <a:xfrm>
+            <a:off x="6202392" y="6457890"/>
+            <a:ext cx="5848710" cy="400110"/>
+          </a:xfrm>
+          <a:prstGeom prst="rect">
+            <a:avLst/>
+          </a:prstGeom>
+          <a:noFill/>
+        </p:spPr>
+        <p:txBody>
+          <a:bodyPr wrap="square" rtlCol="0">
+            <a:spAutoFit/>
+          </a:bodyPr>
+          <a:lstStyle/>
+          <a:p>
+            <a:r>
+              <a:rPr lang="es-CR" sz="2000" dirty="0">
+                <a:solidFill>
+                  <a:schemeClr val="bg1"/>
+                </a:solidFill>
+                <a:latin typeface="Times New Roman" panose="02020603050405020304" pitchFamily="18" charset="0"/>
+                <a:cs typeface="Times New Roman" panose="02020603050405020304" pitchFamily="18" charset="0"/>
+              </a:rPr>
+              <a:t>Ingeniería en Computación, Sede Regional San Carlos</a:t>
+            </a:r>
           </a:p>
         </p:txBody>
       </p:sp>
@@ -4856,6 +6523,1014 @@
     <p:extLst>
       <p:ext uri="{BB962C8B-B14F-4D97-AF65-F5344CB8AC3E}">
         <p14:creationId xmlns:p14="http://schemas.microsoft.com/office/powerpoint/2010/main" val="3335982818"/>
+      </p:ext>
+    </p:extLst>
+  </p:cSld>
+  <p:clrMapOvr>
+    <a:masterClrMapping/>
+  </p:clrMapOvr>
+</p:sld>
+</file>
+
+<file path=ppt/slides/slide5.xml><?xml version="1.0" encoding="utf-8"?>
+<p:sld xmlns:a="http://schemas.openxmlformats.org/drawingml/2006/main" xmlns:r="http://schemas.openxmlformats.org/officeDocument/2006/relationships" xmlns:p="http://schemas.openxmlformats.org/presentationml/2006/main">
+  <p:cSld>
+    <p:spTree>
+      <p:nvGrpSpPr>
+        <p:cNvPr id="1" name=""/>
+        <p:cNvGrpSpPr/>
+        <p:nvPr/>
+      </p:nvGrpSpPr>
+      <p:grpSpPr>
+        <a:xfrm>
+          <a:off x="0" y="0"/>
+          <a:ext cx="0" cy="0"/>
+          <a:chOff x="0" y="0"/>
+          <a:chExt cx="0" cy="0"/>
+        </a:xfrm>
+      </p:grpSpPr>
+      <p:sp>
+        <p:nvSpPr>
+          <p:cNvPr id="2" name="Título 1"/>
+          <p:cNvSpPr>
+            <a:spLocks noGrp="1"/>
+          </p:cNvSpPr>
+          <p:nvPr>
+            <p:ph type="title"/>
+          </p:nvPr>
+        </p:nvSpPr>
+        <p:spPr>
+          <a:xfrm>
+            <a:off x="1097280" y="579504"/>
+            <a:ext cx="10058400" cy="636087"/>
+          </a:xfrm>
+        </p:spPr>
+        <p:txBody>
+          <a:bodyPr>
+            <a:normAutofit/>
+          </a:bodyPr>
+          <a:lstStyle/>
+          <a:p>
+            <a:r>
+              <a:rPr lang="es-CR" sz="4000" dirty="0">
+                <a:latin typeface="Times New Roman" panose="02020603050405020304" pitchFamily="18" charset="0"/>
+                <a:cs typeface="Times New Roman" panose="02020603050405020304" pitchFamily="18" charset="0"/>
+              </a:rPr>
+              <a:t>Creando matriz para suma</a:t>
+            </a:r>
+            <a:endParaRPr lang="en-US" sz="4000" dirty="0">
+              <a:latin typeface="Times New Roman" panose="02020603050405020304" pitchFamily="18" charset="0"/>
+              <a:cs typeface="Times New Roman" panose="02020603050405020304" pitchFamily="18" charset="0"/>
+            </a:endParaRPr>
+          </a:p>
+        </p:txBody>
+      </p:sp>
+      <p:sp>
+        <p:nvSpPr>
+          <p:cNvPr id="3" name="Marcador de contenido 2"/>
+          <p:cNvSpPr>
+            <a:spLocks noGrp="1"/>
+          </p:cNvSpPr>
+          <p:nvPr>
+            <p:ph idx="1"/>
+          </p:nvPr>
+        </p:nvSpPr>
+        <p:spPr/>
+        <p:txBody>
+          <a:bodyPr/>
+          <a:lstStyle/>
+          <a:p>
+            <a:endParaRPr lang="en-US" dirty="0">
+              <a:latin typeface="Times New Roman" panose="02020603050405020304" pitchFamily="18" charset="0"/>
+              <a:cs typeface="Times New Roman" panose="02020603050405020304" pitchFamily="18" charset="0"/>
+            </a:endParaRPr>
+          </a:p>
+        </p:txBody>
+      </p:sp>
+      <p:sp>
+        <p:nvSpPr>
+          <p:cNvPr id="4" name="CuadroTexto 3"/>
+          <p:cNvSpPr txBox="1"/>
+          <p:nvPr/>
+        </p:nvSpPr>
+        <p:spPr>
+          <a:xfrm>
+            <a:off x="6202392" y="6457890"/>
+            <a:ext cx="5848710" cy="400110"/>
+          </a:xfrm>
+          <a:prstGeom prst="rect">
+            <a:avLst/>
+          </a:prstGeom>
+          <a:noFill/>
+        </p:spPr>
+        <p:txBody>
+          <a:bodyPr wrap="square" rtlCol="0">
+            <a:spAutoFit/>
+          </a:bodyPr>
+          <a:lstStyle/>
+          <a:p>
+            <a:r>
+              <a:rPr lang="es-CR" sz="2000" dirty="0">
+                <a:solidFill>
+                  <a:schemeClr val="bg1"/>
+                </a:solidFill>
+                <a:latin typeface="Times New Roman" panose="02020603050405020304" pitchFamily="18" charset="0"/>
+                <a:cs typeface="Times New Roman" panose="02020603050405020304" pitchFamily="18" charset="0"/>
+              </a:rPr>
+              <a:t>Ingeniería en Computación, Sede Regional San Carlos</a:t>
+            </a:r>
+          </a:p>
+        </p:txBody>
+      </p:sp>
+      <p:sp>
+        <p:nvSpPr>
+          <p:cNvPr id="5" name="CuadroTexto 4"/>
+          <p:cNvSpPr txBox="1"/>
+          <p:nvPr/>
+        </p:nvSpPr>
+        <p:spPr>
+          <a:xfrm>
+            <a:off x="120769" y="6457890"/>
+            <a:ext cx="4732386" cy="400110"/>
+          </a:xfrm>
+          <a:prstGeom prst="rect">
+            <a:avLst/>
+          </a:prstGeom>
+          <a:noFill/>
+        </p:spPr>
+        <p:txBody>
+          <a:bodyPr wrap="none" rtlCol="0">
+            <a:spAutoFit/>
+          </a:bodyPr>
+          <a:lstStyle/>
+          <a:p>
+            <a:r>
+              <a:rPr lang="es-CR" sz="2000" dirty="0">
+                <a:solidFill>
+                  <a:schemeClr val="bg1"/>
+                </a:solidFill>
+                <a:latin typeface="Times New Roman" panose="02020603050405020304" pitchFamily="18" charset="0"/>
+                <a:cs typeface="Times New Roman" panose="02020603050405020304" pitchFamily="18" charset="0"/>
+              </a:rPr>
+              <a:t>Tarea Programada, Algebra Lineal, Matrices</a:t>
+            </a:r>
+          </a:p>
+        </p:txBody>
+      </p:sp>
+      <p:pic>
+        <p:nvPicPr>
+          <p:cNvPr id="7" name="Imagen 6"/>
+          <p:cNvPicPr>
+            <a:picLocks noChangeAspect="1"/>
+          </p:cNvPicPr>
+          <p:nvPr/>
+        </p:nvPicPr>
+        <p:blipFill>
+          <a:blip r:embed="rId2"/>
+          <a:stretch>
+            <a:fillRect/>
+          </a:stretch>
+        </p:blipFill>
+        <p:spPr>
+          <a:xfrm>
+            <a:off x="487017" y="1215591"/>
+            <a:ext cx="11270974" cy="4861196"/>
+          </a:xfrm>
+          <a:prstGeom prst="rect">
+            <a:avLst/>
+          </a:prstGeom>
+        </p:spPr>
+      </p:pic>
+    </p:spTree>
+    <p:extLst>
+      <p:ext uri="{BB962C8B-B14F-4D97-AF65-F5344CB8AC3E}">
+        <p14:creationId xmlns:p14="http://schemas.microsoft.com/office/powerpoint/2010/main" val="4251379066"/>
+      </p:ext>
+    </p:extLst>
+  </p:cSld>
+  <p:clrMapOvr>
+    <a:masterClrMapping/>
+  </p:clrMapOvr>
+</p:sld>
+</file>
+
+<file path=ppt/slides/slide6.xml><?xml version="1.0" encoding="utf-8"?>
+<p:sld xmlns:a="http://schemas.openxmlformats.org/drawingml/2006/main" xmlns:r="http://schemas.openxmlformats.org/officeDocument/2006/relationships" xmlns:p="http://schemas.openxmlformats.org/presentationml/2006/main">
+  <p:cSld>
+    <p:spTree>
+      <p:nvGrpSpPr>
+        <p:cNvPr id="1" name=""/>
+        <p:cNvGrpSpPr/>
+        <p:nvPr/>
+      </p:nvGrpSpPr>
+      <p:grpSpPr>
+        <a:xfrm>
+          <a:off x="0" y="0"/>
+          <a:ext cx="0" cy="0"/>
+          <a:chOff x="0" y="0"/>
+          <a:chExt cx="0" cy="0"/>
+        </a:xfrm>
+      </p:grpSpPr>
+      <p:sp>
+        <p:nvSpPr>
+          <p:cNvPr id="2" name="Título 1"/>
+          <p:cNvSpPr>
+            <a:spLocks noGrp="1"/>
+          </p:cNvSpPr>
+          <p:nvPr>
+            <p:ph type="title"/>
+          </p:nvPr>
+        </p:nvSpPr>
+        <p:spPr/>
+        <p:txBody>
+          <a:bodyPr/>
+          <a:lstStyle/>
+          <a:p>
+            <a:r>
+              <a:rPr lang="es-CR" dirty="0">
+                <a:latin typeface="Times New Roman" panose="02020603050405020304" pitchFamily="18" charset="0"/>
+                <a:cs typeface="Times New Roman" panose="02020603050405020304" pitchFamily="18" charset="0"/>
+              </a:rPr>
+              <a:t>Pasos para operación suma de matrices</a:t>
+            </a:r>
+            <a:endParaRPr lang="en-US" dirty="0">
+              <a:latin typeface="Times New Roman" panose="02020603050405020304" pitchFamily="18" charset="0"/>
+              <a:cs typeface="Times New Roman" panose="02020603050405020304" pitchFamily="18" charset="0"/>
+            </a:endParaRPr>
+          </a:p>
+        </p:txBody>
+      </p:sp>
+      <p:sp>
+        <p:nvSpPr>
+          <p:cNvPr id="3" name="Marcador de contenido 2"/>
+          <p:cNvSpPr>
+            <a:spLocks noGrp="1"/>
+          </p:cNvSpPr>
+          <p:nvPr>
+            <p:ph idx="1"/>
+          </p:nvPr>
+        </p:nvSpPr>
+        <p:spPr/>
+        <p:txBody>
+          <a:bodyPr/>
+          <a:lstStyle/>
+          <a:p>
+            <a:r>
+              <a:rPr lang="en-US" dirty="0">
+                <a:latin typeface="Times New Roman" panose="02020603050405020304" pitchFamily="18" charset="0"/>
+                <a:cs typeface="Times New Roman" panose="02020603050405020304" pitchFamily="18" charset="0"/>
+              </a:rPr>
+              <a:t>Para </a:t>
+            </a:r>
+            <a:r>
+              <a:rPr lang="en-US" dirty="0" err="1">
+                <a:latin typeface="Times New Roman" panose="02020603050405020304" pitchFamily="18" charset="0"/>
+                <a:cs typeface="Times New Roman" panose="02020603050405020304" pitchFamily="18" charset="0"/>
+              </a:rPr>
+              <a:t>poder</a:t>
+            </a:r>
+            <a:r>
+              <a:rPr lang="en-US" dirty="0">
+                <a:latin typeface="Times New Roman" panose="02020603050405020304" pitchFamily="18" charset="0"/>
+                <a:cs typeface="Times New Roman" panose="02020603050405020304" pitchFamily="18" charset="0"/>
+              </a:rPr>
+              <a:t> </a:t>
+            </a:r>
+            <a:r>
+              <a:rPr lang="en-US" dirty="0" err="1">
+                <a:latin typeface="Times New Roman" panose="02020603050405020304" pitchFamily="18" charset="0"/>
+                <a:cs typeface="Times New Roman" panose="02020603050405020304" pitchFamily="18" charset="0"/>
+              </a:rPr>
+              <a:t>realizar</a:t>
+            </a:r>
+            <a:r>
+              <a:rPr lang="en-US" dirty="0">
+                <a:latin typeface="Times New Roman" panose="02020603050405020304" pitchFamily="18" charset="0"/>
+                <a:cs typeface="Times New Roman" panose="02020603050405020304" pitchFamily="18" charset="0"/>
+              </a:rPr>
+              <a:t> la </a:t>
+            </a:r>
+            <a:r>
+              <a:rPr lang="en-US" dirty="0" err="1">
+                <a:latin typeface="Times New Roman" panose="02020603050405020304" pitchFamily="18" charset="0"/>
+                <a:cs typeface="Times New Roman" panose="02020603050405020304" pitchFamily="18" charset="0"/>
+              </a:rPr>
+              <a:t>operación</a:t>
+            </a:r>
+            <a:r>
+              <a:rPr lang="en-US" dirty="0">
+                <a:latin typeface="Times New Roman" panose="02020603050405020304" pitchFamily="18" charset="0"/>
+                <a:cs typeface="Times New Roman" panose="02020603050405020304" pitchFamily="18" charset="0"/>
+              </a:rPr>
+              <a:t> de </a:t>
+            </a:r>
+            <a:r>
+              <a:rPr lang="en-US" dirty="0" err="1">
+                <a:latin typeface="Times New Roman" panose="02020603050405020304" pitchFamily="18" charset="0"/>
+                <a:cs typeface="Times New Roman" panose="02020603050405020304" pitchFamily="18" charset="0"/>
+              </a:rPr>
+              <a:t>sumar</a:t>
+            </a:r>
+            <a:r>
+              <a:rPr lang="en-US" dirty="0">
+                <a:latin typeface="Times New Roman" panose="02020603050405020304" pitchFamily="18" charset="0"/>
+                <a:cs typeface="Times New Roman" panose="02020603050405020304" pitchFamily="18" charset="0"/>
+              </a:rPr>
+              <a:t> dos matrices </a:t>
+            </a:r>
+            <a:r>
+              <a:rPr lang="en-US" dirty="0" err="1">
+                <a:latin typeface="Times New Roman" panose="02020603050405020304" pitchFamily="18" charset="0"/>
+                <a:cs typeface="Times New Roman" panose="02020603050405020304" pitchFamily="18" charset="0"/>
+              </a:rPr>
+              <a:t>es</a:t>
+            </a:r>
+            <a:r>
+              <a:rPr lang="en-US" dirty="0">
+                <a:latin typeface="Times New Roman" panose="02020603050405020304" pitchFamily="18" charset="0"/>
+                <a:cs typeface="Times New Roman" panose="02020603050405020304" pitchFamily="18" charset="0"/>
+              </a:rPr>
+              <a:t> </a:t>
+            </a:r>
+            <a:r>
+              <a:rPr lang="en-US" dirty="0" err="1">
+                <a:latin typeface="Times New Roman" panose="02020603050405020304" pitchFamily="18" charset="0"/>
+                <a:cs typeface="Times New Roman" panose="02020603050405020304" pitchFamily="18" charset="0"/>
+              </a:rPr>
+              <a:t>necesario</a:t>
+            </a:r>
+            <a:r>
+              <a:rPr lang="en-US" dirty="0">
+                <a:latin typeface="Times New Roman" panose="02020603050405020304" pitchFamily="18" charset="0"/>
+                <a:cs typeface="Times New Roman" panose="02020603050405020304" pitchFamily="18" charset="0"/>
+              </a:rPr>
+              <a:t> que </a:t>
+            </a:r>
+            <a:r>
+              <a:rPr lang="en-US" dirty="0" err="1">
+                <a:latin typeface="Times New Roman" panose="02020603050405020304" pitchFamily="18" charset="0"/>
+                <a:cs typeface="Times New Roman" panose="02020603050405020304" pitchFamily="18" charset="0"/>
+              </a:rPr>
+              <a:t>los</a:t>
+            </a:r>
+            <a:r>
+              <a:rPr lang="en-US" dirty="0">
+                <a:latin typeface="Times New Roman" panose="02020603050405020304" pitchFamily="18" charset="0"/>
+                <a:cs typeface="Times New Roman" panose="02020603050405020304" pitchFamily="18" charset="0"/>
+              </a:rPr>
+              <a:t> </a:t>
+            </a:r>
+            <a:r>
+              <a:rPr lang="en-US" dirty="0" err="1">
+                <a:latin typeface="Times New Roman" panose="02020603050405020304" pitchFamily="18" charset="0"/>
+                <a:cs typeface="Times New Roman" panose="02020603050405020304" pitchFamily="18" charset="0"/>
+              </a:rPr>
+              <a:t>tama</a:t>
+            </a:r>
+            <a:r>
+              <a:rPr lang="es-CR" dirty="0" err="1">
+                <a:latin typeface="Times New Roman" panose="02020603050405020304" pitchFamily="18" charset="0"/>
+                <a:cs typeface="Times New Roman" panose="02020603050405020304" pitchFamily="18" charset="0"/>
+              </a:rPr>
+              <a:t>ños</a:t>
+            </a:r>
+            <a:r>
+              <a:rPr lang="es-CR" dirty="0">
+                <a:latin typeface="Times New Roman" panose="02020603050405020304" pitchFamily="18" charset="0"/>
+                <a:cs typeface="Times New Roman" panose="02020603050405020304" pitchFamily="18" charset="0"/>
+              </a:rPr>
+              <a:t> de ambas matrices sean iguales tanto en filas como columnas.</a:t>
+            </a:r>
+          </a:p>
+          <a:p>
+            <a:r>
+              <a:rPr lang="es-CR" dirty="0">
+                <a:latin typeface="Times New Roman" panose="02020603050405020304" pitchFamily="18" charset="0"/>
+                <a:cs typeface="Times New Roman" panose="02020603050405020304" pitchFamily="18" charset="0"/>
+              </a:rPr>
+              <a:t>Luego hay que seleccionar la opción de suma en la sección de operaciones, seguidamente hay que llenar la matriz con los números que deseamos ingresar. Por ultimo hay que seleccionar la manera en la que deseamos mostrar los resultado; ya sea paso a paso o el resultado final de una vez.</a:t>
+            </a:r>
+            <a:endParaRPr lang="en-US" dirty="0">
+              <a:latin typeface="Times New Roman" panose="02020603050405020304" pitchFamily="18" charset="0"/>
+              <a:cs typeface="Times New Roman" panose="02020603050405020304" pitchFamily="18" charset="0"/>
+            </a:endParaRPr>
+          </a:p>
+        </p:txBody>
+      </p:sp>
+      <p:sp>
+        <p:nvSpPr>
+          <p:cNvPr id="4" name="CuadroTexto 3"/>
+          <p:cNvSpPr txBox="1"/>
+          <p:nvPr/>
+        </p:nvSpPr>
+        <p:spPr>
+          <a:xfrm>
+            <a:off x="6202392" y="6457890"/>
+            <a:ext cx="5848710" cy="400110"/>
+          </a:xfrm>
+          <a:prstGeom prst="rect">
+            <a:avLst/>
+          </a:prstGeom>
+          <a:noFill/>
+        </p:spPr>
+        <p:txBody>
+          <a:bodyPr wrap="square" rtlCol="0">
+            <a:spAutoFit/>
+          </a:bodyPr>
+          <a:lstStyle/>
+          <a:p>
+            <a:r>
+              <a:rPr lang="es-CR" sz="2000" dirty="0">
+                <a:solidFill>
+                  <a:schemeClr val="bg1"/>
+                </a:solidFill>
+                <a:latin typeface="Times New Roman" panose="02020603050405020304" pitchFamily="18" charset="0"/>
+                <a:cs typeface="Times New Roman" panose="02020603050405020304" pitchFamily="18" charset="0"/>
+              </a:rPr>
+              <a:t>Ingeniería en Computación, Sede Regional San Carlos</a:t>
+            </a:r>
+          </a:p>
+        </p:txBody>
+      </p:sp>
+      <p:sp>
+        <p:nvSpPr>
+          <p:cNvPr id="5" name="CuadroTexto 4"/>
+          <p:cNvSpPr txBox="1"/>
+          <p:nvPr/>
+        </p:nvSpPr>
+        <p:spPr>
+          <a:xfrm>
+            <a:off x="120769" y="6457890"/>
+            <a:ext cx="4732386" cy="400110"/>
+          </a:xfrm>
+          <a:prstGeom prst="rect">
+            <a:avLst/>
+          </a:prstGeom>
+          <a:noFill/>
+        </p:spPr>
+        <p:txBody>
+          <a:bodyPr wrap="none" rtlCol="0">
+            <a:spAutoFit/>
+          </a:bodyPr>
+          <a:lstStyle/>
+          <a:p>
+            <a:r>
+              <a:rPr lang="es-CR" sz="2000" dirty="0">
+                <a:solidFill>
+                  <a:schemeClr val="bg1"/>
+                </a:solidFill>
+                <a:latin typeface="Times New Roman" panose="02020603050405020304" pitchFamily="18" charset="0"/>
+                <a:cs typeface="Times New Roman" panose="02020603050405020304" pitchFamily="18" charset="0"/>
+              </a:rPr>
+              <a:t>Tarea Programada, Algebra Lineal, Matrices</a:t>
+            </a:r>
+          </a:p>
+        </p:txBody>
+      </p:sp>
+    </p:spTree>
+    <p:extLst>
+      <p:ext uri="{BB962C8B-B14F-4D97-AF65-F5344CB8AC3E}">
+        <p14:creationId xmlns:p14="http://schemas.microsoft.com/office/powerpoint/2010/main" val="3749184410"/>
+      </p:ext>
+    </p:extLst>
+  </p:cSld>
+  <p:clrMapOvr>
+    <a:masterClrMapping/>
+  </p:clrMapOvr>
+</p:sld>
+</file>
+
+<file path=ppt/slides/slide7.xml><?xml version="1.0" encoding="utf-8"?>
+<p:sld xmlns:a="http://schemas.openxmlformats.org/drawingml/2006/main" xmlns:r="http://schemas.openxmlformats.org/officeDocument/2006/relationships" xmlns:p="http://schemas.openxmlformats.org/presentationml/2006/main">
+  <p:cSld>
+    <p:spTree>
+      <p:nvGrpSpPr>
+        <p:cNvPr id="1" name=""/>
+        <p:cNvGrpSpPr/>
+        <p:nvPr/>
+      </p:nvGrpSpPr>
+      <p:grpSpPr>
+        <a:xfrm>
+          <a:off x="0" y="0"/>
+          <a:ext cx="0" cy="0"/>
+          <a:chOff x="0" y="0"/>
+          <a:chExt cx="0" cy="0"/>
+        </a:xfrm>
+      </p:grpSpPr>
+      <p:sp>
+        <p:nvSpPr>
+          <p:cNvPr id="2" name="Título 1"/>
+          <p:cNvSpPr>
+            <a:spLocks noGrp="1"/>
+          </p:cNvSpPr>
+          <p:nvPr>
+            <p:ph type="title"/>
+          </p:nvPr>
+        </p:nvSpPr>
+        <p:spPr>
+          <a:xfrm>
+            <a:off x="1173192" y="261400"/>
+            <a:ext cx="10058400" cy="983973"/>
+          </a:xfrm>
+        </p:spPr>
+        <p:txBody>
+          <a:bodyPr/>
+          <a:lstStyle/>
+          <a:p>
+            <a:r>
+              <a:rPr lang="es-CR" dirty="0">
+                <a:latin typeface="Times New Roman" panose="02020603050405020304" pitchFamily="18" charset="0"/>
+                <a:cs typeface="Times New Roman" panose="02020603050405020304" pitchFamily="18" charset="0"/>
+              </a:rPr>
+              <a:t>Resultado final sin pasos</a:t>
+            </a:r>
+            <a:endParaRPr lang="en-US" dirty="0">
+              <a:latin typeface="Times New Roman" panose="02020603050405020304" pitchFamily="18" charset="0"/>
+              <a:cs typeface="Times New Roman" panose="02020603050405020304" pitchFamily="18" charset="0"/>
+            </a:endParaRPr>
+          </a:p>
+        </p:txBody>
+      </p:sp>
+      <p:pic>
+        <p:nvPicPr>
+          <p:cNvPr id="6" name="Marcador de contenido 5"/>
+          <p:cNvPicPr>
+            <a:picLocks noGrp="1" noChangeAspect="1"/>
+          </p:cNvPicPr>
+          <p:nvPr>
+            <p:ph idx="1"/>
+          </p:nvPr>
+        </p:nvPicPr>
+        <p:blipFill>
+          <a:blip r:embed="rId2"/>
+          <a:stretch>
+            <a:fillRect/>
+          </a:stretch>
+        </p:blipFill>
+        <p:spPr>
+          <a:xfrm>
+            <a:off x="1524738" y="1879309"/>
+            <a:ext cx="9355308" cy="4024569"/>
+          </a:xfrm>
+          <a:prstGeom prst="rect">
+            <a:avLst/>
+          </a:prstGeom>
+          <a:ln>
+            <a:noFill/>
+          </a:ln>
+          <a:effectLst>
+            <a:outerShdw blurRad="50800" dist="38100" dir="2700000" algn="tl" rotWithShape="0">
+              <a:prstClr val="black">
+                <a:alpha val="40000"/>
+              </a:prstClr>
+            </a:outerShdw>
+            <a:softEdge rad="12700"/>
+          </a:effectLst>
+        </p:spPr>
+      </p:pic>
+      <p:sp>
+        <p:nvSpPr>
+          <p:cNvPr id="4" name="CuadroTexto 3"/>
+          <p:cNvSpPr txBox="1"/>
+          <p:nvPr/>
+        </p:nvSpPr>
+        <p:spPr>
+          <a:xfrm>
+            <a:off x="6202392" y="6457890"/>
+            <a:ext cx="5848710" cy="400110"/>
+          </a:xfrm>
+          <a:prstGeom prst="rect">
+            <a:avLst/>
+          </a:prstGeom>
+          <a:noFill/>
+        </p:spPr>
+        <p:txBody>
+          <a:bodyPr wrap="square" rtlCol="0">
+            <a:spAutoFit/>
+          </a:bodyPr>
+          <a:lstStyle/>
+          <a:p>
+            <a:r>
+              <a:rPr lang="es-CR" sz="2000" dirty="0">
+                <a:solidFill>
+                  <a:schemeClr val="bg1"/>
+                </a:solidFill>
+                <a:latin typeface="Times New Roman" panose="02020603050405020304" pitchFamily="18" charset="0"/>
+                <a:cs typeface="Times New Roman" panose="02020603050405020304" pitchFamily="18" charset="0"/>
+              </a:rPr>
+              <a:t>Ingeniería en Computación, Sede Regional San Carlos</a:t>
+            </a:r>
+          </a:p>
+        </p:txBody>
+      </p:sp>
+      <p:sp>
+        <p:nvSpPr>
+          <p:cNvPr id="5" name="CuadroTexto 4"/>
+          <p:cNvSpPr txBox="1"/>
+          <p:nvPr/>
+        </p:nvSpPr>
+        <p:spPr>
+          <a:xfrm>
+            <a:off x="120769" y="6457890"/>
+            <a:ext cx="4732386" cy="400110"/>
+          </a:xfrm>
+          <a:prstGeom prst="rect">
+            <a:avLst/>
+          </a:prstGeom>
+          <a:noFill/>
+        </p:spPr>
+        <p:txBody>
+          <a:bodyPr wrap="none" rtlCol="0">
+            <a:spAutoFit/>
+          </a:bodyPr>
+          <a:lstStyle/>
+          <a:p>
+            <a:r>
+              <a:rPr lang="es-CR" sz="2000" dirty="0">
+                <a:solidFill>
+                  <a:schemeClr val="bg1"/>
+                </a:solidFill>
+                <a:latin typeface="Times New Roman" panose="02020603050405020304" pitchFamily="18" charset="0"/>
+                <a:cs typeface="Times New Roman" panose="02020603050405020304" pitchFamily="18" charset="0"/>
+              </a:rPr>
+              <a:t>Tarea Programada, Algebra Lineal, Matrices</a:t>
+            </a:r>
+          </a:p>
+        </p:txBody>
+      </p:sp>
+    </p:spTree>
+    <p:extLst>
+      <p:ext uri="{BB962C8B-B14F-4D97-AF65-F5344CB8AC3E}">
+        <p14:creationId xmlns:p14="http://schemas.microsoft.com/office/powerpoint/2010/main" val="2354186975"/>
+      </p:ext>
+    </p:extLst>
+  </p:cSld>
+  <p:clrMapOvr>
+    <a:masterClrMapping/>
+  </p:clrMapOvr>
+</p:sld>
+</file>
+
+<file path=ppt/slides/slide8.xml><?xml version="1.0" encoding="utf-8"?>
+<p:sld xmlns:a="http://schemas.openxmlformats.org/drawingml/2006/main" xmlns:r="http://schemas.openxmlformats.org/officeDocument/2006/relationships" xmlns:p="http://schemas.openxmlformats.org/presentationml/2006/main">
+  <p:cSld>
+    <p:spTree>
+      <p:nvGrpSpPr>
+        <p:cNvPr id="1" name=""/>
+        <p:cNvGrpSpPr/>
+        <p:nvPr/>
+      </p:nvGrpSpPr>
+      <p:grpSpPr>
+        <a:xfrm>
+          <a:off x="0" y="0"/>
+          <a:ext cx="0" cy="0"/>
+          <a:chOff x="0" y="0"/>
+          <a:chExt cx="0" cy="0"/>
+        </a:xfrm>
+      </p:grpSpPr>
+      <p:sp>
+        <p:nvSpPr>
+          <p:cNvPr id="2" name="Título 1"/>
+          <p:cNvSpPr>
+            <a:spLocks noGrp="1"/>
+          </p:cNvSpPr>
+          <p:nvPr>
+            <p:ph type="title"/>
+          </p:nvPr>
+        </p:nvSpPr>
+        <p:spPr>
+          <a:xfrm>
+            <a:off x="1097280" y="217030"/>
+            <a:ext cx="10058400" cy="766945"/>
+          </a:xfrm>
+        </p:spPr>
+        <p:txBody>
+          <a:bodyPr/>
+          <a:lstStyle/>
+          <a:p>
+            <a:r>
+              <a:rPr lang="es-CR" dirty="0">
+                <a:latin typeface="Times New Roman" panose="02020603050405020304" pitchFamily="18" charset="0"/>
+                <a:cs typeface="Times New Roman" panose="02020603050405020304" pitchFamily="18" charset="0"/>
+              </a:rPr>
+              <a:t>Resultado final con pasos</a:t>
+            </a:r>
+            <a:endParaRPr lang="en-US" dirty="0">
+              <a:latin typeface="Times New Roman" panose="02020603050405020304" pitchFamily="18" charset="0"/>
+              <a:cs typeface="Times New Roman" panose="02020603050405020304" pitchFamily="18" charset="0"/>
+            </a:endParaRPr>
+          </a:p>
+        </p:txBody>
+      </p:sp>
+      <p:sp>
+        <p:nvSpPr>
+          <p:cNvPr id="4" name="CuadroTexto 3"/>
+          <p:cNvSpPr txBox="1"/>
+          <p:nvPr/>
+        </p:nvSpPr>
+        <p:spPr>
+          <a:xfrm>
+            <a:off x="6202392" y="6457890"/>
+            <a:ext cx="5848710" cy="400110"/>
+          </a:xfrm>
+          <a:prstGeom prst="rect">
+            <a:avLst/>
+          </a:prstGeom>
+          <a:noFill/>
+        </p:spPr>
+        <p:txBody>
+          <a:bodyPr wrap="square" rtlCol="0">
+            <a:spAutoFit/>
+          </a:bodyPr>
+          <a:lstStyle/>
+          <a:p>
+            <a:r>
+              <a:rPr lang="es-CR" sz="2000" dirty="0">
+                <a:solidFill>
+                  <a:schemeClr val="bg1"/>
+                </a:solidFill>
+                <a:latin typeface="Times New Roman" panose="02020603050405020304" pitchFamily="18" charset="0"/>
+                <a:cs typeface="Times New Roman" panose="02020603050405020304" pitchFamily="18" charset="0"/>
+              </a:rPr>
+              <a:t>Ingeniería en Computación, Sede Regional San Carlos</a:t>
+            </a:r>
+          </a:p>
+        </p:txBody>
+      </p:sp>
+      <p:sp>
+        <p:nvSpPr>
+          <p:cNvPr id="5" name="CuadroTexto 4"/>
+          <p:cNvSpPr txBox="1"/>
+          <p:nvPr/>
+        </p:nvSpPr>
+        <p:spPr>
+          <a:xfrm>
+            <a:off x="120769" y="6457890"/>
+            <a:ext cx="4732386" cy="400110"/>
+          </a:xfrm>
+          <a:prstGeom prst="rect">
+            <a:avLst/>
+          </a:prstGeom>
+          <a:noFill/>
+        </p:spPr>
+        <p:txBody>
+          <a:bodyPr wrap="none" rtlCol="0">
+            <a:spAutoFit/>
+          </a:bodyPr>
+          <a:lstStyle/>
+          <a:p>
+            <a:r>
+              <a:rPr lang="es-CR" sz="2000" dirty="0">
+                <a:solidFill>
+                  <a:schemeClr val="bg1"/>
+                </a:solidFill>
+                <a:latin typeface="Times New Roman" panose="02020603050405020304" pitchFamily="18" charset="0"/>
+                <a:cs typeface="Times New Roman" panose="02020603050405020304" pitchFamily="18" charset="0"/>
+              </a:rPr>
+              <a:t>Tarea Programada, Algebra Lineal, Matrices</a:t>
+            </a:r>
+          </a:p>
+        </p:txBody>
+      </p:sp>
+      <p:pic>
+        <p:nvPicPr>
+          <p:cNvPr id="9" name="Imagen 8"/>
+          <p:cNvPicPr>
+            <a:picLocks noChangeAspect="1"/>
+          </p:cNvPicPr>
+          <p:nvPr/>
+        </p:nvPicPr>
+        <p:blipFill>
+          <a:blip r:embed="rId2"/>
+          <a:stretch>
+            <a:fillRect/>
+          </a:stretch>
+        </p:blipFill>
+        <p:spPr>
+          <a:xfrm>
+            <a:off x="5655397" y="3527730"/>
+            <a:ext cx="6395705" cy="2743200"/>
+          </a:xfrm>
+          <a:prstGeom prst="rect">
+            <a:avLst/>
+          </a:prstGeom>
+          <a:ln>
+            <a:noFill/>
+          </a:ln>
+          <a:effectLst>
+            <a:outerShdw blurRad="190500" algn="tl" rotWithShape="0">
+              <a:srgbClr val="000000">
+                <a:alpha val="70000"/>
+              </a:srgbClr>
+            </a:outerShdw>
+            <a:softEdge rad="12700"/>
+          </a:effectLst>
+        </p:spPr>
+      </p:pic>
+      <p:pic>
+        <p:nvPicPr>
+          <p:cNvPr id="8" name="Marcador de contenido 7"/>
+          <p:cNvPicPr>
+            <a:picLocks noGrp="1" noChangeAspect="1"/>
+          </p:cNvPicPr>
+          <p:nvPr>
+            <p:ph idx="1"/>
+          </p:nvPr>
+        </p:nvPicPr>
+        <p:blipFill>
+          <a:blip r:embed="rId3"/>
+          <a:stretch>
+            <a:fillRect/>
+          </a:stretch>
+        </p:blipFill>
+        <p:spPr>
+          <a:xfrm>
+            <a:off x="120769" y="957643"/>
+            <a:ext cx="6374705" cy="2745617"/>
+          </a:xfrm>
+          <a:prstGeom prst="rect">
+            <a:avLst/>
+          </a:prstGeom>
+        </p:spPr>
+      </p:pic>
+    </p:spTree>
+    <p:extLst>
+      <p:ext uri="{BB962C8B-B14F-4D97-AF65-F5344CB8AC3E}">
+        <p14:creationId xmlns:p14="http://schemas.microsoft.com/office/powerpoint/2010/main" val="1814577455"/>
+      </p:ext>
+    </p:extLst>
+  </p:cSld>
+  <p:clrMapOvr>
+    <a:masterClrMapping/>
+  </p:clrMapOvr>
+</p:sld>
+</file>
+
+<file path=ppt/slides/slide9.xml><?xml version="1.0" encoding="utf-8"?>
+<p:sld xmlns:a="http://schemas.openxmlformats.org/drawingml/2006/main" xmlns:r="http://schemas.openxmlformats.org/officeDocument/2006/relationships" xmlns:p="http://schemas.openxmlformats.org/presentationml/2006/main">
+  <p:cSld>
+    <p:spTree>
+      <p:nvGrpSpPr>
+        <p:cNvPr id="1" name=""/>
+        <p:cNvGrpSpPr/>
+        <p:nvPr/>
+      </p:nvGrpSpPr>
+      <p:grpSpPr>
+        <a:xfrm>
+          <a:off x="0" y="0"/>
+          <a:ext cx="0" cy="0"/>
+          <a:chOff x="0" y="0"/>
+          <a:chExt cx="0" cy="0"/>
+        </a:xfrm>
+      </p:grpSpPr>
+      <p:sp>
+        <p:nvSpPr>
+          <p:cNvPr id="2" name="Título 1"/>
+          <p:cNvSpPr>
+            <a:spLocks noGrp="1"/>
+          </p:cNvSpPr>
+          <p:nvPr>
+            <p:ph type="title"/>
+          </p:nvPr>
+        </p:nvSpPr>
+        <p:spPr>
+          <a:xfrm>
+            <a:off x="1097280" y="286604"/>
+            <a:ext cx="10058400" cy="1075058"/>
+          </a:xfrm>
+        </p:spPr>
+        <p:txBody>
+          <a:bodyPr/>
+          <a:lstStyle/>
+          <a:p>
+            <a:r>
+              <a:rPr lang="es-CR" dirty="0">
+                <a:latin typeface="Times New Roman" panose="02020603050405020304" pitchFamily="18" charset="0"/>
+                <a:cs typeface="Times New Roman" panose="02020603050405020304" pitchFamily="18" charset="0"/>
+              </a:rPr>
+              <a:t>Creando matriz para resta</a:t>
+            </a:r>
+            <a:endParaRPr lang="en-US" dirty="0"/>
+          </a:p>
+        </p:txBody>
+      </p:sp>
+      <p:sp>
+        <p:nvSpPr>
+          <p:cNvPr id="3" name="Marcador de contenido 2"/>
+          <p:cNvSpPr>
+            <a:spLocks noGrp="1"/>
+          </p:cNvSpPr>
+          <p:nvPr>
+            <p:ph idx="1"/>
+          </p:nvPr>
+        </p:nvSpPr>
+        <p:spPr/>
+        <p:txBody>
+          <a:bodyPr/>
+          <a:lstStyle/>
+          <a:p>
+            <a:endParaRPr lang="en-US"/>
+          </a:p>
+        </p:txBody>
+      </p:sp>
+      <p:sp>
+        <p:nvSpPr>
+          <p:cNvPr id="5" name="CuadroTexto 4"/>
+          <p:cNvSpPr txBox="1"/>
+          <p:nvPr/>
+        </p:nvSpPr>
+        <p:spPr>
+          <a:xfrm>
+            <a:off x="6202392" y="6457890"/>
+            <a:ext cx="5848710" cy="400110"/>
+          </a:xfrm>
+          <a:prstGeom prst="rect">
+            <a:avLst/>
+          </a:prstGeom>
+          <a:noFill/>
+        </p:spPr>
+        <p:txBody>
+          <a:bodyPr wrap="square" rtlCol="0">
+            <a:spAutoFit/>
+          </a:bodyPr>
+          <a:lstStyle/>
+          <a:p>
+            <a:r>
+              <a:rPr lang="es-CR" sz="2000" dirty="0">
+                <a:solidFill>
+                  <a:schemeClr val="bg1"/>
+                </a:solidFill>
+                <a:latin typeface="Times New Roman" panose="02020603050405020304" pitchFamily="18" charset="0"/>
+                <a:cs typeface="Times New Roman" panose="02020603050405020304" pitchFamily="18" charset="0"/>
+              </a:rPr>
+              <a:t>Ingeniería en Computación, Sede Regional San Carlos</a:t>
+            </a:r>
+          </a:p>
+        </p:txBody>
+      </p:sp>
+      <p:sp>
+        <p:nvSpPr>
+          <p:cNvPr id="6" name="CuadroTexto 5"/>
+          <p:cNvSpPr txBox="1"/>
+          <p:nvPr/>
+        </p:nvSpPr>
+        <p:spPr>
+          <a:xfrm>
+            <a:off x="120769" y="6457890"/>
+            <a:ext cx="4732386" cy="400110"/>
+          </a:xfrm>
+          <a:prstGeom prst="rect">
+            <a:avLst/>
+          </a:prstGeom>
+          <a:noFill/>
+        </p:spPr>
+        <p:txBody>
+          <a:bodyPr wrap="none" rtlCol="0">
+            <a:spAutoFit/>
+          </a:bodyPr>
+          <a:lstStyle/>
+          <a:p>
+            <a:r>
+              <a:rPr lang="es-CR" sz="2000" dirty="0">
+                <a:solidFill>
+                  <a:schemeClr val="bg1"/>
+                </a:solidFill>
+                <a:latin typeface="Times New Roman" panose="02020603050405020304" pitchFamily="18" charset="0"/>
+                <a:cs typeface="Times New Roman" panose="02020603050405020304" pitchFamily="18" charset="0"/>
+              </a:rPr>
+              <a:t>Tarea Programada, Algebra Lineal, Matrices</a:t>
+            </a:r>
+          </a:p>
+        </p:txBody>
+      </p:sp>
+      <p:pic>
+        <p:nvPicPr>
+          <p:cNvPr id="7" name="Imagen 6"/>
+          <p:cNvPicPr>
+            <a:picLocks noChangeAspect="1"/>
+          </p:cNvPicPr>
+          <p:nvPr/>
+        </p:nvPicPr>
+        <p:blipFill>
+          <a:blip r:embed="rId2"/>
+          <a:stretch>
+            <a:fillRect/>
+          </a:stretch>
+        </p:blipFill>
+        <p:spPr>
+          <a:xfrm>
+            <a:off x="943223" y="1545434"/>
+            <a:ext cx="10366513" cy="4451649"/>
+          </a:xfrm>
+          <a:prstGeom prst="rect">
+            <a:avLst/>
+          </a:prstGeom>
+        </p:spPr>
+      </p:pic>
+    </p:spTree>
+    <p:extLst>
+      <p:ext uri="{BB962C8B-B14F-4D97-AF65-F5344CB8AC3E}">
+        <p14:creationId xmlns:p14="http://schemas.microsoft.com/office/powerpoint/2010/main" val="347836632"/>
       </p:ext>
     </p:extLst>
   </p:cSld>

</xml_diff>